<commit_message>
[Engineering] update background ppt.
</commit_message>
<xml_diff>
--- a/engineering/2017/materials/ppt/background.pptx
+++ b/engineering/2017/materials/ppt/background.pptx
@@ -253,7 +253,7 @@
             <a:fld id="{97373330-0875-4F54-B846-34A9C5D83194}" type="datetimeFigureOut">
               <a:rPr lang="en-US" smtClean="0"/>
               <a:pPr/>
-              <a:t>7/6/17</a:t>
+              <a:t>08-04-2017</a:t>
             </a:fld>
             <a:endParaRPr lang="en-US"/>
           </a:p>
@@ -660,10 +660,9 @@
           <a:lstStyle/>
           <a:p>
             <a:r>
-              <a:rPr lang="en-US" dirty="0" smtClean="0"/>
+              <a:rPr lang="en-US" dirty="0"/>
               <a:t>1.</a:t>
             </a:r>
-            <a:endParaRPr lang="en-US" dirty="0"/>
           </a:p>
         </p:txBody>
       </p:sp>
@@ -749,29 +748,29 @@
           <a:lstStyle/>
           <a:p>
             <a:r>
-              <a:rPr lang="zh-CN" altLang="en-US" dirty="0" smtClean="0"/>
+              <a:rPr lang="zh-CN" altLang="en-US" dirty="0"/>
               <a:t>先做一个引子</a:t>
             </a:r>
-            <a:endParaRPr lang="en-US" altLang="zh-CN" dirty="0" smtClean="0"/>
-          </a:p>
-          <a:p>
-            <a:r>
-              <a:rPr lang="en-US" altLang="zh-CN" dirty="0" smtClean="0"/>
+            <a:endParaRPr lang="en-US" altLang="zh-CN" dirty="0"/>
+          </a:p>
+          <a:p>
+            <a:r>
+              <a:rPr lang="en-US" altLang="zh-CN" dirty="0"/>
               <a:t>1.</a:t>
             </a:r>
             <a:r>
-              <a:rPr lang="zh-CN" altLang="en-US" dirty="0" smtClean="0"/>
+              <a:rPr lang="zh-CN" altLang="en-US" dirty="0"/>
               <a:t>表明</a:t>
             </a:r>
             <a:r>
-              <a:rPr lang="en-US" altLang="zh-CN" dirty="0" smtClean="0"/>
+              <a:rPr lang="en-US" altLang="zh-CN" dirty="0"/>
               <a:t>Google</a:t>
             </a:r>
             <a:r>
-              <a:rPr lang="zh-CN" altLang="en-US" dirty="0" smtClean="0"/>
+              <a:rPr lang="zh-CN" altLang="en-US" dirty="0"/>
               <a:t>证明了网站性能对用户数量的重要性</a:t>
             </a:r>
-            <a:endParaRPr lang="en-US" altLang="zh-CN" dirty="0" smtClean="0"/>
+            <a:endParaRPr lang="en-US" altLang="zh-CN" dirty="0"/>
           </a:p>
         </p:txBody>
       </p:sp>
@@ -857,45 +856,45 @@
           <a:lstStyle/>
           <a:p>
             <a:r>
-              <a:rPr lang="en-US" altLang="zh-CN" dirty="0" smtClean="0"/>
+              <a:rPr lang="en-US" altLang="zh-CN" dirty="0"/>
               <a:t>2.</a:t>
             </a:r>
             <a:r>
-              <a:rPr lang="zh-CN" altLang="en-US" dirty="0" smtClean="0"/>
+              <a:rPr lang="zh-CN" altLang="en-US" dirty="0"/>
               <a:t>接着上面</a:t>
             </a:r>
             <a:r>
-              <a:rPr lang="en-US" altLang="zh-CN" dirty="0" smtClean="0"/>
+              <a:rPr lang="en-US" altLang="zh-CN" dirty="0"/>
               <a:t>Google</a:t>
             </a:r>
             <a:r>
-              <a:rPr lang="zh-CN" altLang="en-US" dirty="0" smtClean="0"/>
+              <a:rPr lang="zh-CN" altLang="en-US" dirty="0"/>
               <a:t>的故事提出一个引子</a:t>
             </a:r>
-            <a:endParaRPr lang="en-US" altLang="zh-CN" dirty="0" smtClean="0"/>
-          </a:p>
-          <a:p>
-            <a:r>
-              <a:rPr lang="zh-CN" altLang="en-US" dirty="0" smtClean="0"/>
+            <a:endParaRPr lang="en-US" altLang="zh-CN" dirty="0"/>
+          </a:p>
+          <a:p>
+            <a:r>
+              <a:rPr lang="zh-CN" altLang="en-US" dirty="0"/>
               <a:t>讲一个故事</a:t>
             </a:r>
             <a:r>
-              <a:rPr lang="en-US" altLang="zh-CN" dirty="0" smtClean="0"/>
+              <a:rPr lang="en-US" altLang="zh-CN" dirty="0"/>
               <a:t>:</a:t>
             </a:r>
           </a:p>
           <a:p>
             <a:r>
-              <a:rPr lang="zh-CN" altLang="en-US" dirty="0" smtClean="0"/>
+              <a:rPr lang="zh-CN" altLang="en-US" dirty="0"/>
               <a:t>这个故事是从知乎上看到的</a:t>
             </a:r>
             <a:r>
-              <a:rPr lang="en-US" altLang="zh-CN" dirty="0" smtClean="0"/>
+              <a:rPr lang="en-US" altLang="zh-CN" dirty="0"/>
               <a:t>.</a:t>
             </a:r>
           </a:p>
           <a:p>
-            <a:endParaRPr lang="en-US" altLang="zh-CN" dirty="0" smtClean="0"/>
+            <a:endParaRPr lang="en-US" altLang="zh-CN" dirty="0"/>
           </a:p>
           <a:p>
             <a:pPr marL="0" marR="0" indent="0" algn="l" defTabSz="914400" rtl="0" eaLnBrk="1" fontAlgn="auto" latinLnBrk="0" hangingPunct="1">
@@ -916,7 +915,7 @@
               <a:defRPr/>
             </a:pPr>
             <a:r>
-              <a:rPr lang="zh-CN" altLang="en-US" sz="1200" b="1" i="0" kern="1200" dirty="0" smtClean="0">
+              <a:rPr lang="zh-CN" altLang="en-US" sz="1200" b="1" i="0" kern="1200" dirty="0">
                 <a:solidFill>
                   <a:schemeClr val="tx1"/>
                 </a:solidFill>
@@ -928,7 +927,7 @@
               <a:t>为什么</a:t>
             </a:r>
             <a:r>
-              <a:rPr lang="en-US" altLang="zh-CN" sz="1200" b="1" i="0" kern="1200" dirty="0" smtClean="0">
+              <a:rPr lang="en-US" altLang="zh-CN" sz="1200" b="1" i="0" kern="1200" dirty="0">
                 <a:solidFill>
                   <a:schemeClr val="tx1"/>
                 </a:solidFill>
@@ -940,7 +939,7 @@
               <a:t>Stack Overflow</a:t>
             </a:r>
             <a:r>
-              <a:rPr lang="zh-CN" altLang="en-US" sz="1200" b="1" i="0" kern="1200" dirty="0" smtClean="0">
+              <a:rPr lang="zh-CN" altLang="en-US" sz="1200" b="1" i="0" kern="1200" dirty="0">
                 <a:solidFill>
                   <a:schemeClr val="tx1"/>
                 </a:solidFill>
@@ -952,7 +951,7 @@
               <a:t>只需要</a:t>
             </a:r>
             <a:r>
-              <a:rPr lang="en-US" altLang="zh-CN" sz="1200" b="1" i="0" kern="1200" dirty="0" smtClean="0">
+              <a:rPr lang="en-US" altLang="zh-CN" sz="1200" b="1" i="0" kern="1200" dirty="0">
                 <a:solidFill>
                   <a:schemeClr val="tx1"/>
                 </a:solidFill>
@@ -964,7 +963,7 @@
               <a:t>11</a:t>
             </a:r>
             <a:r>
-              <a:rPr lang="zh-CN" altLang="en-US" sz="1200" b="1" i="0" kern="1200" dirty="0" smtClean="0">
+              <a:rPr lang="zh-CN" altLang="en-US" sz="1200" b="1" i="0" kern="1200" dirty="0">
                 <a:solidFill>
                   <a:schemeClr val="tx1"/>
                 </a:solidFill>
@@ -976,7 +975,7 @@
               <a:t>台</a:t>
             </a:r>
             <a:r>
-              <a:rPr lang="en-US" altLang="zh-CN" sz="1200" b="1" i="0" kern="1200" dirty="0" smtClean="0">
+              <a:rPr lang="en-US" altLang="zh-CN" sz="1200" b="1" i="0" kern="1200" dirty="0">
                 <a:solidFill>
                   <a:schemeClr val="tx1"/>
                 </a:solidFill>
@@ -988,7 +987,7 @@
               <a:t>IIS </a:t>
             </a:r>
             <a:r>
-              <a:rPr lang="zh-CN" altLang="en-US" sz="1200" b="1" i="0" kern="1200" dirty="0" smtClean="0">
+              <a:rPr lang="zh-CN" altLang="en-US" sz="1200" b="1" i="0" kern="1200" dirty="0">
                 <a:solidFill>
                   <a:schemeClr val="tx1"/>
                 </a:solidFill>
@@ -1000,7 +999,7 @@
               <a:t>服务器和</a:t>
             </a:r>
             <a:r>
-              <a:rPr lang="en-US" altLang="zh-CN" sz="1200" b="1" i="0" kern="1200" dirty="0" smtClean="0">
+              <a:rPr lang="en-US" altLang="zh-CN" sz="1200" b="1" i="0" kern="1200" dirty="0">
                 <a:solidFill>
                   <a:schemeClr val="tx1"/>
                 </a:solidFill>
@@ -1012,7 +1011,7 @@
               <a:t>4</a:t>
             </a:r>
             <a:r>
-              <a:rPr lang="zh-CN" altLang="en-US" sz="1200" b="1" i="0" kern="1200" dirty="0" smtClean="0">
+              <a:rPr lang="zh-CN" altLang="en-US" sz="1200" b="1" i="0" kern="1200" dirty="0">
                 <a:solidFill>
                   <a:schemeClr val="tx1"/>
                 </a:solidFill>
@@ -1025,7 +1024,7 @@
             </a:r>
           </a:p>
           <a:p>
-            <a:endParaRPr lang="en-US" altLang="zh-CN" sz="1200" b="0" i="0" kern="1200" dirty="0" smtClean="0">
+            <a:endParaRPr lang="en-US" altLang="zh-CN" sz="1200" b="0" i="0" kern="1200" dirty="0">
               <a:solidFill>
                 <a:schemeClr val="tx1"/>
               </a:solidFill>
@@ -1036,7 +1035,7 @@
             </a:endParaRPr>
           </a:p>
           <a:p>
-            <a:endParaRPr lang="en-US" altLang="zh-CN" sz="1200" b="0" i="0" kern="1200" dirty="0" smtClean="0">
+            <a:endParaRPr lang="en-US" altLang="zh-CN" sz="1200" b="0" i="0" kern="1200" dirty="0">
               <a:solidFill>
                 <a:schemeClr val="tx1"/>
               </a:solidFill>
@@ -1048,7 +1047,7 @@
           </a:p>
           <a:p>
             <a:r>
-              <a:rPr lang="zh-CN" altLang="en-US" sz="1200" b="0" i="0" kern="1200" dirty="0" smtClean="0">
+              <a:rPr lang="zh-CN" altLang="en-US" sz="1200" b="0" i="0" kern="1200" dirty="0">
                 <a:solidFill>
                   <a:schemeClr val="tx1"/>
                 </a:solidFill>
@@ -1060,7 +1059,7 @@
               <a:t>至于</a:t>
             </a:r>
             <a:r>
-              <a:rPr lang="en-US" altLang="zh-CN" sz="1200" b="0" i="0" kern="1200" dirty="0" err="1" smtClean="0">
+              <a:rPr lang="en-US" altLang="zh-CN" sz="1200" b="0" i="0" kern="1200" dirty="0" err="1">
                 <a:solidFill>
                   <a:schemeClr val="tx1"/>
                 </a:solidFill>
@@ -1072,7 +1071,7 @@
               <a:t>stackoverflow</a:t>
             </a:r>
             <a:r>
-              <a:rPr lang="zh-CN" altLang="en-US" sz="1200" b="0" i="0" kern="1200" dirty="0" smtClean="0">
+              <a:rPr lang="zh-CN" altLang="en-US" sz="1200" b="0" i="0" kern="1200" dirty="0">
                 <a:solidFill>
                   <a:schemeClr val="tx1"/>
                 </a:solidFill>
@@ -1083,15 +1082,11 @@
               </a:rPr>
               <a:t>，我想他们也没有发明什么太多银子弹黑魔法，指数级的提高性能。他们做到的只是：找到了合格的程序员。</a:t>
             </a:r>
-            <a:r>
-              <a:rPr lang="zh-CN" altLang="en-US" dirty="0" smtClean="0"/>
-              <a:t/>
-            </a:r>
             <a:br>
-              <a:rPr lang="zh-CN" altLang="en-US" dirty="0" smtClean="0"/>
+              <a:rPr lang="zh-CN" altLang="en-US" dirty="0"/>
             </a:br>
             <a:r>
-              <a:rPr lang="zh-CN" altLang="en-US" sz="1200" b="0" i="0" kern="1200" dirty="0" smtClean="0">
+              <a:rPr lang="zh-CN" altLang="en-US" sz="1200" b="0" i="0" kern="1200" dirty="0">
                 <a:solidFill>
                   <a:schemeClr val="tx1"/>
                 </a:solidFill>
@@ -1102,7 +1097,7 @@
               </a:rPr>
               <a:t>这就够了。</a:t>
             </a:r>
-            <a:endParaRPr lang="en-US" altLang="zh-CN" sz="1200" b="0" i="0" kern="1200" dirty="0" smtClean="0">
+            <a:endParaRPr lang="en-US" altLang="zh-CN" sz="1200" b="0" i="0" kern="1200" dirty="0">
               <a:solidFill>
                 <a:schemeClr val="tx1"/>
               </a:solidFill>
@@ -1113,7 +1108,7 @@
             </a:endParaRPr>
           </a:p>
           <a:p>
-            <a:endParaRPr lang="en-US" altLang="zh-CN" sz="1200" b="0" i="0" kern="1200" dirty="0" smtClean="0">
+            <a:endParaRPr lang="en-US" altLang="zh-CN" sz="1200" b="0" i="0" kern="1200" dirty="0">
               <a:solidFill>
                 <a:schemeClr val="tx1"/>
               </a:solidFill>
@@ -1124,85 +1119,85 @@
             </a:endParaRPr>
           </a:p>
           <a:p>
-            <a:endParaRPr lang="en-US" altLang="zh-CN" dirty="0" smtClean="0"/>
-          </a:p>
-          <a:p>
-            <a:r>
-              <a:rPr lang="en-US" altLang="zh-CN" dirty="0" smtClean="0"/>
+            <a:endParaRPr lang="en-US" altLang="zh-CN" dirty="0"/>
+          </a:p>
+          <a:p>
+            <a:r>
+              <a:rPr lang="en-US" altLang="zh-CN" dirty="0"/>
               <a:t>https://</a:t>
             </a:r>
             <a:r>
-              <a:rPr lang="en-US" altLang="zh-CN" dirty="0" err="1" smtClean="0"/>
+              <a:rPr lang="en-US" altLang="zh-CN" dirty="0" err="1"/>
               <a:t>www.zhihu.com</a:t>
             </a:r>
             <a:r>
-              <a:rPr lang="en-US" altLang="zh-CN" dirty="0" smtClean="0"/>
+              <a:rPr lang="en-US" altLang="zh-CN" dirty="0"/>
               <a:t>/question/40514188</a:t>
             </a:r>
           </a:p>
           <a:p>
             <a:r>
-              <a:rPr lang="en-US" altLang="zh-CN" dirty="0" smtClean="0"/>
+              <a:rPr lang="en-US" altLang="zh-CN" dirty="0"/>
               <a:t>https://</a:t>
             </a:r>
             <a:r>
-              <a:rPr lang="en-US" altLang="zh-CN" dirty="0" err="1" smtClean="0"/>
+              <a:rPr lang="en-US" altLang="zh-CN" dirty="0" err="1"/>
               <a:t>link.zhihu.com</a:t>
             </a:r>
             <a:r>
-              <a:rPr lang="en-US" altLang="zh-CN" dirty="0" smtClean="0"/>
+              <a:rPr lang="en-US" altLang="zh-CN" dirty="0"/>
               <a:t>/?target=http%3A//</a:t>
             </a:r>
             <a:r>
-              <a:rPr lang="en-US" altLang="zh-CN" dirty="0" err="1" smtClean="0"/>
+              <a:rPr lang="en-US" altLang="zh-CN" dirty="0" err="1"/>
               <a:t>nickcraver.com</a:t>
             </a:r>
             <a:r>
-              <a:rPr lang="en-US" altLang="zh-CN" dirty="0" smtClean="0"/>
+              <a:rPr lang="en-US" altLang="zh-CN" dirty="0"/>
               <a:t>/blog/2016/02/17/stack-overflow-the-architecture-2016-edition/</a:t>
             </a:r>
           </a:p>
           <a:p>
-            <a:endParaRPr lang="en-US" altLang="zh-CN" dirty="0" smtClean="0"/>
-          </a:p>
-          <a:p>
-            <a:r>
-              <a:rPr lang="zh-CN" altLang="en-US" dirty="0" smtClean="0"/>
+            <a:endParaRPr lang="en-US" altLang="zh-CN" dirty="0"/>
+          </a:p>
+          <a:p>
+            <a:r>
+              <a:rPr lang="zh-CN" altLang="en-US" dirty="0"/>
               <a:t>引出了</a:t>
             </a:r>
             <a:r>
-              <a:rPr lang="en-US" altLang="zh-CN" dirty="0" err="1" smtClean="0"/>
+              <a:rPr lang="en-US" altLang="zh-CN" dirty="0" err="1"/>
               <a:t>StackOverflow</a:t>
             </a:r>
             <a:r>
-              <a:rPr lang="zh-CN" altLang="en-US" dirty="0" smtClean="0"/>
+              <a:rPr lang="zh-CN" altLang="en-US" dirty="0"/>
               <a:t>的</a:t>
             </a:r>
             <a:r>
-              <a:rPr lang="en-US" altLang="zh-CN" dirty="0" smtClean="0"/>
+              <a:rPr lang="en-US" altLang="zh-CN" dirty="0"/>
               <a:t>Best</a:t>
             </a:r>
             <a:r>
-              <a:rPr lang="zh-CN" altLang="en-US" dirty="0" smtClean="0"/>
+              <a:rPr lang="zh-CN" altLang="en-US" dirty="0"/>
               <a:t> </a:t>
             </a:r>
             <a:r>
-              <a:rPr lang="en-US" altLang="zh-CN" dirty="0" smtClean="0"/>
+              <a:rPr lang="en-US" altLang="zh-CN" dirty="0"/>
               <a:t>Practice</a:t>
             </a:r>
             <a:r>
-              <a:rPr lang="zh-CN" altLang="en-US" dirty="0" smtClean="0"/>
+              <a:rPr lang="zh-CN" altLang="en-US" dirty="0"/>
               <a:t> 经验</a:t>
             </a:r>
             <a:r>
-              <a:rPr lang="en-US" altLang="zh-CN" dirty="0" smtClean="0"/>
+              <a:rPr lang="en-US" altLang="zh-CN" dirty="0"/>
               <a:t>:</a:t>
             </a:r>
             <a:r>
-              <a:rPr lang="zh-CN" altLang="en-US" dirty="0" smtClean="0"/>
+              <a:rPr lang="zh-CN" altLang="en-US" dirty="0"/>
               <a:t> 一开始就遵循雅虎的网页性能指导原则</a:t>
             </a:r>
-            <a:endParaRPr lang="en-US" altLang="zh-CN" dirty="0" smtClean="0"/>
+            <a:endParaRPr lang="en-US" altLang="zh-CN" dirty="0"/>
           </a:p>
         </p:txBody>
       </p:sp>
@@ -1288,92 +1283,92 @@
           <a:lstStyle/>
           <a:p>
             <a:r>
-              <a:rPr lang="en-US" dirty="0" smtClean="0"/>
+              <a:rPr lang="en-US" dirty="0"/>
               <a:t>References:</a:t>
             </a:r>
           </a:p>
           <a:p>
             <a:r>
-              <a:rPr lang="en-US" dirty="0" smtClean="0"/>
+              <a:rPr lang="en-US" dirty="0"/>
               <a:t>1.</a:t>
             </a:r>
             <a:r>
-              <a:rPr lang="zh-CN" altLang="en-US" dirty="0" smtClean="0"/>
+              <a:rPr lang="zh-CN" altLang="en-US" dirty="0"/>
               <a:t>雅虎提出的网站性能优化的</a:t>
             </a:r>
             <a:r>
-              <a:rPr lang="en-US" altLang="zh-CN" dirty="0" smtClean="0"/>
+              <a:rPr lang="en-US" altLang="zh-CN" dirty="0"/>
               <a:t>14(</a:t>
             </a:r>
             <a:r>
-              <a:rPr lang="zh-CN" altLang="en-US" dirty="0" smtClean="0"/>
+              <a:rPr lang="zh-CN" altLang="en-US" dirty="0"/>
               <a:t>数不清</a:t>
             </a:r>
             <a:r>
-              <a:rPr lang="en-US" altLang="zh-CN" dirty="0" smtClean="0"/>
+              <a:rPr lang="en-US" altLang="zh-CN" dirty="0"/>
               <a:t>..)</a:t>
             </a:r>
             <a:r>
-              <a:rPr lang="zh-CN" altLang="en-US" dirty="0" smtClean="0"/>
+              <a:rPr lang="zh-CN" altLang="en-US" dirty="0"/>
               <a:t>条准则</a:t>
             </a:r>
             <a:r>
-              <a:rPr lang="en-US" altLang="zh-CN" dirty="0" smtClean="0"/>
+              <a:rPr lang="en-US" altLang="zh-CN" dirty="0"/>
               <a:t>.</a:t>
             </a:r>
-            <a:endParaRPr lang="en-US" dirty="0" smtClean="0">
+            <a:endParaRPr lang="en-US" dirty="0">
               <a:hlinkClick r:id="rId3"/>
             </a:endParaRPr>
           </a:p>
           <a:p>
             <a:r>
-              <a:rPr lang="en-US" altLang="zh-CN" dirty="0" smtClean="0"/>
+              <a:rPr lang="en-US" altLang="zh-CN" dirty="0"/>
               <a:t>https://</a:t>
             </a:r>
             <a:r>
-              <a:rPr lang="en-US" altLang="zh-CN" dirty="0" err="1" smtClean="0"/>
+              <a:rPr lang="en-US" altLang="zh-CN" dirty="0" err="1"/>
               <a:t>developer.yahoo.com</a:t>
             </a:r>
             <a:r>
-              <a:rPr lang="en-US" altLang="zh-CN" dirty="0" smtClean="0"/>
+              <a:rPr lang="en-US" altLang="zh-CN" dirty="0"/>
               <a:t>/performance/</a:t>
             </a:r>
             <a:r>
-              <a:rPr lang="en-US" altLang="zh-CN" dirty="0" err="1" smtClean="0"/>
+              <a:rPr lang="en-US" altLang="zh-CN" dirty="0" err="1"/>
               <a:t>rules.html</a:t>
             </a:r>
-            <a:endParaRPr lang="en-US" altLang="zh-CN" dirty="0" smtClean="0"/>
-          </a:p>
-          <a:p>
-            <a:endParaRPr lang="en-US" altLang="zh-CN" dirty="0" smtClean="0"/>
-          </a:p>
-          <a:p>
-            <a:r>
-              <a:rPr lang="en-US" altLang="zh-CN" dirty="0" smtClean="0">
+            <a:endParaRPr lang="en-US" altLang="zh-CN" dirty="0"/>
+          </a:p>
+          <a:p>
+            <a:endParaRPr lang="en-US" altLang="zh-CN" dirty="0"/>
+          </a:p>
+          <a:p>
+            <a:r>
+              <a:rPr lang="en-US" altLang="zh-CN" dirty="0">
                 <a:effectLst/>
               </a:rPr>
               <a:t>Yahoo </a:t>
             </a:r>
             <a:r>
-              <a:rPr lang="zh-CN" altLang="en-US" dirty="0" smtClean="0">
+              <a:rPr lang="zh-CN" altLang="en-US" dirty="0">
                 <a:effectLst/>
               </a:rPr>
               <a:t>在</a:t>
             </a:r>
             <a:r>
-              <a:rPr lang="en-US" altLang="zh-CN" dirty="0" smtClean="0">
+              <a:rPr lang="en-US" altLang="zh-CN" dirty="0">
                 <a:effectLst/>
               </a:rPr>
               <a:t>2007</a:t>
             </a:r>
             <a:r>
-              <a:rPr lang="zh-CN" altLang="en-US" dirty="0" smtClean="0">
+              <a:rPr lang="zh-CN" altLang="en-US" dirty="0">
                 <a:effectLst/>
               </a:rPr>
               <a:t>年提出并总结的网站性能优化准则与实践建议</a:t>
             </a:r>
             <a:r>
-              <a:rPr lang="en-US" altLang="zh-CN" dirty="0" smtClean="0">
+              <a:rPr lang="en-US" altLang="zh-CN" dirty="0">
                 <a:effectLst/>
               </a:rPr>
               <a:t>, </a:t>
@@ -1381,72 +1376,72 @@
           </a:p>
           <a:p>
             <a:r>
-              <a:rPr lang="zh-CN" altLang="en-US" dirty="0" smtClean="0"/>
+              <a:rPr lang="zh-CN" altLang="en-US" dirty="0"/>
               <a:t>虽然是年代有点久远</a:t>
             </a:r>
             <a:r>
-              <a:rPr lang="en-US" altLang="zh-CN" dirty="0" smtClean="0"/>
+              <a:rPr lang="en-US" altLang="zh-CN" dirty="0"/>
               <a:t>,</a:t>
             </a:r>
             <a:r>
-              <a:rPr lang="zh-CN" altLang="en-US" dirty="0" smtClean="0"/>
+              <a:rPr lang="zh-CN" altLang="en-US" dirty="0"/>
               <a:t>但是里面提及的经验经久不衰</a:t>
             </a:r>
             <a:r>
-              <a:rPr lang="en-US" altLang="zh-CN" dirty="0" smtClean="0"/>
+              <a:rPr lang="en-US" altLang="zh-CN" dirty="0"/>
               <a:t>. </a:t>
             </a:r>
           </a:p>
           <a:p>
             <a:r>
-              <a:rPr lang="zh-CN" altLang="en-US" dirty="0" smtClean="0"/>
+              <a:rPr lang="zh-CN" altLang="en-US" dirty="0"/>
               <a:t>先不提及这些建议出现背后的原理</a:t>
             </a:r>
             <a:r>
-              <a:rPr lang="en-US" altLang="zh-CN" dirty="0" smtClean="0"/>
+              <a:rPr lang="en-US" altLang="zh-CN" dirty="0"/>
               <a:t>.</a:t>
             </a:r>
             <a:r>
-              <a:rPr lang="zh-CN" altLang="en-US" dirty="0" smtClean="0"/>
+              <a:rPr lang="zh-CN" altLang="en-US" dirty="0"/>
               <a:t>可以先过一下目</a:t>
             </a:r>
             <a:r>
-              <a:rPr lang="en-US" altLang="zh-CN" dirty="0" smtClean="0"/>
+              <a:rPr lang="en-US" altLang="zh-CN" dirty="0"/>
               <a:t>,</a:t>
             </a:r>
             <a:r>
-              <a:rPr lang="zh-CN" altLang="en-US" dirty="0" smtClean="0"/>
+              <a:rPr lang="zh-CN" altLang="en-US" dirty="0"/>
               <a:t>了解一下相关名词</a:t>
             </a:r>
             <a:r>
-              <a:rPr lang="en-US" altLang="zh-CN" dirty="0" smtClean="0"/>
+              <a:rPr lang="en-US" altLang="zh-CN" dirty="0"/>
               <a:t>. </a:t>
             </a:r>
           </a:p>
           <a:p>
-            <a:endParaRPr lang="en-US" altLang="zh-CN" dirty="0" smtClean="0"/>
-          </a:p>
-          <a:p>
-            <a:endParaRPr lang="en-US" altLang="zh-CN" dirty="0" smtClean="0"/>
-          </a:p>
-          <a:p>
-            <a:r>
-              <a:rPr lang="en-US" altLang="zh-CN" dirty="0" smtClean="0"/>
+            <a:endParaRPr lang="en-US" altLang="zh-CN" dirty="0"/>
+          </a:p>
+          <a:p>
+            <a:endParaRPr lang="en-US" altLang="zh-CN" dirty="0"/>
+          </a:p>
+          <a:p>
+            <a:r>
+              <a:rPr lang="en-US" altLang="zh-CN" dirty="0"/>
               <a:t>2.</a:t>
             </a:r>
             <a:r>
-              <a:rPr lang="zh-CN" altLang="en-US" dirty="0" smtClean="0"/>
+              <a:rPr lang="zh-CN" altLang="en-US" dirty="0"/>
               <a:t>前端基础篇</a:t>
             </a:r>
             <a:r>
-              <a:rPr lang="en-US" altLang="zh-CN" dirty="0" smtClean="0"/>
+              <a:rPr lang="en-US" altLang="zh-CN" dirty="0"/>
               <a:t>:</a:t>
             </a:r>
             <a:r>
-              <a:rPr lang="zh-CN" altLang="en-US" dirty="0" smtClean="0"/>
+              <a:rPr lang="zh-CN" altLang="en-US" dirty="0"/>
               <a:t> 前端工程与性能优化</a:t>
             </a:r>
-            <a:endParaRPr lang="en-US" altLang="zh-CN" dirty="0" smtClean="0"/>
+            <a:endParaRPr lang="en-US" altLang="zh-CN" dirty="0"/>
           </a:p>
           <a:p>
             <a:pPr marL="0" marR="0" indent="0" algn="l" defTabSz="914400" rtl="0" eaLnBrk="1" fontAlgn="auto" latinLnBrk="0" hangingPunct="1">
@@ -1467,23 +1462,23 @@
               <a:defRPr/>
             </a:pPr>
             <a:r>
-              <a:rPr lang="en-US" dirty="0" smtClean="0"/>
+              <a:rPr lang="en-US" dirty="0"/>
               <a:t>https://</a:t>
             </a:r>
             <a:r>
-              <a:rPr lang="en-US" dirty="0" err="1" smtClean="0"/>
+              <a:rPr lang="en-US" dirty="0" err="1"/>
               <a:t>github.com</a:t>
             </a:r>
             <a:r>
-              <a:rPr lang="en-US" dirty="0" smtClean="0"/>
+              <a:rPr lang="en-US" dirty="0"/>
               <a:t>/</a:t>
             </a:r>
             <a:r>
-              <a:rPr lang="en-US" dirty="0" err="1" smtClean="0"/>
+              <a:rPr lang="en-US" dirty="0" err="1"/>
               <a:t>fouber</a:t>
             </a:r>
             <a:r>
-              <a:rPr lang="en-US" dirty="0" smtClean="0"/>
+              <a:rPr lang="en-US" dirty="0"/>
               <a:t>/blog/issues/3</a:t>
             </a:r>
           </a:p>
@@ -1505,7 +1500,7 @@
               <a:tabLst/>
               <a:defRPr/>
             </a:pPr>
-            <a:endParaRPr lang="en-US" dirty="0" smtClean="0"/>
+            <a:endParaRPr lang="en-US" dirty="0"/>
           </a:p>
           <a:p>
             <a:pPr marL="0" marR="0" indent="0" algn="l" defTabSz="914400" rtl="0" eaLnBrk="1" fontAlgn="auto" latinLnBrk="0" hangingPunct="1">
@@ -1526,14 +1521,14 @@
               <a:defRPr/>
             </a:pPr>
             <a:r>
-              <a:rPr lang="en-US" altLang="zh-CN" dirty="0" smtClean="0"/>
+              <a:rPr lang="en-US" altLang="zh-CN" dirty="0"/>
               <a:t>3.Google</a:t>
             </a:r>
             <a:r>
-              <a:rPr lang="zh-CN" altLang="en-US" dirty="0" smtClean="0"/>
+              <a:rPr lang="zh-CN" altLang="en-US" dirty="0"/>
               <a:t>的性能测试工具</a:t>
             </a:r>
-            <a:endParaRPr lang="en-US" altLang="zh-CN" dirty="0" smtClean="0"/>
+            <a:endParaRPr lang="en-US" altLang="zh-CN" dirty="0"/>
           </a:p>
           <a:p>
             <a:pPr marL="0" marR="0" indent="0" algn="l" defTabSz="914400" rtl="0" eaLnBrk="1" fontAlgn="auto" latinLnBrk="0" hangingPunct="1">
@@ -1554,23 +1549,23 @@
               <a:defRPr/>
             </a:pPr>
             <a:r>
-              <a:rPr lang="en-US" dirty="0" smtClean="0"/>
+              <a:rPr lang="en-US" dirty="0"/>
               <a:t>https://</a:t>
             </a:r>
             <a:r>
-              <a:rPr lang="en-US" dirty="0" err="1" smtClean="0"/>
+              <a:rPr lang="en-US" dirty="0" err="1"/>
               <a:t>developers.google.com</a:t>
             </a:r>
             <a:r>
-              <a:rPr lang="en-US" dirty="0" smtClean="0"/>
+              <a:rPr lang="en-US" dirty="0"/>
               <a:t>/speed/</a:t>
             </a:r>
             <a:r>
-              <a:rPr lang="en-US" dirty="0" err="1" smtClean="0"/>
+              <a:rPr lang="en-US" dirty="0" err="1"/>
               <a:t>pagespeed</a:t>
             </a:r>
             <a:r>
-              <a:rPr lang="en-US" dirty="0" smtClean="0"/>
+              <a:rPr lang="en-US" dirty="0"/>
               <a:t>/</a:t>
             </a:r>
           </a:p>
@@ -1592,10 +1587,10 @@
               <a:tabLst/>
               <a:defRPr/>
             </a:pPr>
-            <a:endParaRPr lang="en-US" dirty="0" smtClean="0"/>
-          </a:p>
-          <a:p>
-            <a:endParaRPr lang="en-US" altLang="zh-CN" dirty="0" smtClean="0"/>
+            <a:endParaRPr lang="en-US" dirty="0"/>
+          </a:p>
+          <a:p>
+            <a:endParaRPr lang="en-US" altLang="zh-CN" dirty="0"/>
           </a:p>
         </p:txBody>
       </p:sp>
@@ -1681,92 +1676,92 @@
           <a:lstStyle/>
           <a:p>
             <a:r>
-              <a:rPr lang="zh-CN" altLang="en-US" dirty="0" smtClean="0"/>
+              <a:rPr lang="zh-CN" altLang="en-US" dirty="0"/>
               <a:t>在提出上面的引子之后</a:t>
             </a:r>
             <a:r>
-              <a:rPr lang="en-US" altLang="zh-CN" dirty="0" smtClean="0"/>
+              <a:rPr lang="en-US" altLang="zh-CN" dirty="0"/>
               <a:t>:</a:t>
             </a:r>
           </a:p>
           <a:p>
             <a:r>
-              <a:rPr lang="zh-CN" altLang="en-US" dirty="0" smtClean="0"/>
+              <a:rPr lang="zh-CN" altLang="en-US" dirty="0"/>
               <a:t>引出下面一个问题</a:t>
             </a:r>
             <a:r>
-              <a:rPr lang="en-US" altLang="zh-CN" dirty="0" smtClean="0"/>
+              <a:rPr lang="en-US" altLang="zh-CN" dirty="0"/>
               <a:t>:</a:t>
             </a:r>
           </a:p>
           <a:p>
             <a:r>
-              <a:rPr lang="zh-CN" altLang="en-US" dirty="0" smtClean="0"/>
+              <a:rPr lang="zh-CN" altLang="en-US" dirty="0"/>
               <a:t>既然网站性能很重要</a:t>
             </a:r>
             <a:r>
-              <a:rPr lang="en-US" altLang="zh-CN" dirty="0" smtClean="0"/>
+              <a:rPr lang="en-US" altLang="zh-CN" dirty="0"/>
               <a:t>.</a:t>
             </a:r>
           </a:p>
           <a:p>
             <a:r>
-              <a:rPr lang="zh-CN" altLang="en-US" dirty="0" smtClean="0"/>
+              <a:rPr lang="zh-CN" altLang="en-US" dirty="0"/>
               <a:t>建设网站的时候</a:t>
             </a:r>
             <a:r>
-              <a:rPr lang="en-US" altLang="zh-CN" dirty="0" smtClean="0"/>
+              <a:rPr lang="en-US" altLang="zh-CN" dirty="0"/>
               <a:t>,</a:t>
             </a:r>
             <a:r>
-              <a:rPr lang="zh-CN" altLang="en-US" dirty="0" smtClean="0"/>
+              <a:rPr lang="zh-CN" altLang="en-US" dirty="0"/>
               <a:t>遵循雅虎的网站优化原则很重要</a:t>
             </a:r>
             <a:r>
-              <a:rPr lang="en-US" altLang="zh-CN" dirty="0" smtClean="0"/>
+              <a:rPr lang="en-US" altLang="zh-CN" dirty="0"/>
               <a:t>.</a:t>
             </a:r>
           </a:p>
           <a:p>
-            <a:endParaRPr lang="en-US" altLang="zh-CN" dirty="0" smtClean="0"/>
-          </a:p>
-          <a:p>
-            <a:r>
-              <a:rPr lang="zh-CN" altLang="en-US" dirty="0" smtClean="0"/>
+            <a:endParaRPr lang="en-US" altLang="zh-CN" dirty="0"/>
+          </a:p>
+          <a:p>
+            <a:r>
+              <a:rPr lang="zh-CN" altLang="en-US" dirty="0"/>
               <a:t>那么</a:t>
             </a:r>
             <a:r>
-              <a:rPr lang="zh-CN" altLang="en-US" baseline="0" dirty="0" smtClean="0"/>
+              <a:rPr lang="zh-CN" altLang="en-US" baseline="0" dirty="0"/>
               <a:t> 工程化</a:t>
             </a:r>
             <a:r>
-              <a:rPr lang="en-US" altLang="zh-CN" baseline="0" dirty="0" smtClean="0"/>
+              <a:rPr lang="en-US" altLang="zh-CN" baseline="0" dirty="0"/>
               <a:t>(JavaScript/</a:t>
             </a:r>
             <a:r>
-              <a:rPr lang="zh-CN" altLang="en-US" baseline="0" dirty="0" smtClean="0"/>
+              <a:rPr lang="zh-CN" altLang="en-US" baseline="0" dirty="0"/>
               <a:t>前端工程化</a:t>
             </a:r>
             <a:r>
-              <a:rPr lang="en-US" altLang="zh-CN" baseline="0" dirty="0" smtClean="0"/>
+              <a:rPr lang="en-US" altLang="zh-CN" baseline="0" dirty="0"/>
               <a:t>)</a:t>
             </a:r>
             <a:r>
-              <a:rPr lang="zh-CN" altLang="en-US" baseline="0" dirty="0" smtClean="0"/>
+              <a:rPr lang="zh-CN" altLang="en-US" baseline="0" dirty="0"/>
               <a:t>要怎么做</a:t>
             </a:r>
-            <a:endParaRPr lang="en-US" altLang="zh-CN" baseline="0" dirty="0" smtClean="0"/>
-          </a:p>
-          <a:p>
-            <a:r>
-              <a:rPr lang="zh-CN" altLang="en-US" baseline="0" dirty="0" smtClean="0"/>
+            <a:endParaRPr lang="en-US" altLang="zh-CN" baseline="0" dirty="0"/>
+          </a:p>
+          <a:p>
+            <a:r>
+              <a:rPr lang="zh-CN" altLang="en-US" baseline="0" dirty="0"/>
               <a:t>才能在建设一个高性能网站应用的过程中发挥作用呢</a:t>
             </a:r>
             <a:r>
-              <a:rPr lang="en-US" altLang="zh-CN" baseline="0" dirty="0" smtClean="0"/>
+              <a:rPr lang="en-US" altLang="zh-CN" baseline="0" dirty="0"/>
               <a:t>?</a:t>
             </a:r>
-            <a:endParaRPr lang="en-US" altLang="zh-CN" dirty="0" smtClean="0"/>
+            <a:endParaRPr lang="en-US" altLang="zh-CN" dirty="0"/>
           </a:p>
         </p:txBody>
       </p:sp>
@@ -1852,47 +1847,47 @@
           <a:lstStyle/>
           <a:p>
             <a:r>
-              <a:rPr lang="zh-CN" altLang="en-US" dirty="0" smtClean="0"/>
+              <a:rPr lang="zh-CN" altLang="en-US" dirty="0"/>
               <a:t>这一部分</a:t>
             </a:r>
             <a:r>
-              <a:rPr lang="en-US" altLang="zh-CN" dirty="0" smtClean="0"/>
+              <a:rPr lang="en-US" altLang="zh-CN" dirty="0"/>
               <a:t>,</a:t>
             </a:r>
             <a:r>
-              <a:rPr lang="zh-CN" altLang="en-US" dirty="0" smtClean="0"/>
+              <a:rPr lang="zh-CN" altLang="en-US" dirty="0"/>
               <a:t>主要介绍</a:t>
             </a:r>
-            <a:endParaRPr lang="en-US" altLang="zh-CN" dirty="0" smtClean="0"/>
-          </a:p>
-          <a:p>
-            <a:r>
-              <a:rPr lang="zh-CN" altLang="en-US" dirty="0" smtClean="0"/>
+            <a:endParaRPr lang="en-US" altLang="zh-CN" dirty="0"/>
+          </a:p>
+          <a:p>
+            <a:r>
+              <a:rPr lang="zh-CN" altLang="en-US" dirty="0"/>
               <a:t>前端</a:t>
             </a:r>
             <a:r>
-              <a:rPr lang="en-US" altLang="zh-CN" dirty="0" smtClean="0"/>
+              <a:rPr lang="en-US" altLang="zh-CN" dirty="0"/>
               <a:t>/JavaScript</a:t>
             </a:r>
             <a:r>
-              <a:rPr lang="zh-CN" altLang="en-US" dirty="0" smtClean="0"/>
+              <a:rPr lang="zh-CN" altLang="en-US" dirty="0"/>
               <a:t>项目工程化在项目中的定位</a:t>
             </a:r>
             <a:r>
-              <a:rPr lang="en-US" altLang="zh-CN" dirty="0" smtClean="0"/>
+              <a:rPr lang="en-US" altLang="zh-CN" dirty="0"/>
               <a:t>.</a:t>
             </a:r>
           </a:p>
           <a:p>
-            <a:endParaRPr lang="en-US" dirty="0" smtClean="0"/>
-          </a:p>
-          <a:p>
-            <a:r>
-              <a:rPr lang="zh-CN" altLang="en-US" dirty="0" smtClean="0"/>
+            <a:endParaRPr lang="en-US" dirty="0"/>
+          </a:p>
+          <a:p>
+            <a:r>
+              <a:rPr lang="zh-CN" altLang="en-US" dirty="0"/>
               <a:t>中间会分成三个大步骤</a:t>
             </a:r>
             <a:r>
-              <a:rPr lang="en-US" altLang="zh-CN" dirty="0" smtClean="0"/>
+              <a:rPr lang="en-US" altLang="zh-CN" dirty="0"/>
               <a:t>:</a:t>
             </a:r>
           </a:p>
@@ -1915,7 +1910,7 @@
               <a:defRPr/>
             </a:pPr>
             <a:r>
-              <a:rPr lang="zh-CN" altLang="en-US" sz="1200" b="1" i="0" kern="1200" dirty="0" smtClean="0">
+              <a:rPr lang="zh-CN" altLang="en-US" sz="1200" b="1" i="0" kern="1200" dirty="0">
                 <a:solidFill>
                   <a:schemeClr val="tx1"/>
                 </a:solidFill>
@@ -1927,7 +1922,7 @@
               <a:t>第一阶段：库</a:t>
             </a:r>
             <a:r>
-              <a:rPr lang="en-US" altLang="zh-CN" sz="1200" b="1" i="0" kern="1200" dirty="0" smtClean="0">
+              <a:rPr lang="en-US" altLang="zh-CN" sz="1200" b="1" i="0" kern="1200" dirty="0">
                 <a:solidFill>
                   <a:schemeClr val="tx1"/>
                 </a:solidFill>
@@ -1939,7 +1934,7 @@
               <a:t>/</a:t>
             </a:r>
             <a:r>
-              <a:rPr lang="zh-CN" altLang="en-US" sz="1200" b="1" i="0" kern="1200" dirty="0" smtClean="0">
+              <a:rPr lang="zh-CN" altLang="en-US" sz="1200" b="1" i="0" kern="1200" dirty="0">
                 <a:solidFill>
                   <a:schemeClr val="tx1"/>
                 </a:solidFill>
@@ -1970,7 +1965,7 @@
               <a:defRPr/>
             </a:pPr>
             <a:r>
-              <a:rPr lang="zh-CN" altLang="en-US" sz="1200" b="1" i="0" kern="1200" dirty="0" smtClean="0">
+              <a:rPr lang="zh-CN" altLang="en-US" sz="1200" b="1" i="0" kern="1200" dirty="0">
                 <a:solidFill>
                   <a:schemeClr val="tx1"/>
                 </a:solidFill>
@@ -2001,7 +1996,7 @@
               <a:defRPr/>
             </a:pPr>
             <a:r>
-              <a:rPr lang="zh-CN" altLang="en-US" sz="1200" b="1" i="0" kern="1200" dirty="0" smtClean="0">
+              <a:rPr lang="zh-CN" altLang="en-US" sz="1200" b="1" i="0" kern="1200" dirty="0">
                 <a:solidFill>
                   <a:schemeClr val="tx1"/>
                 </a:solidFill>
@@ -2013,7 +2008,7 @@
               <a:t>第三阶段：</a:t>
             </a:r>
             <a:r>
-              <a:rPr lang="en-US" altLang="zh-CN" sz="1200" b="1" i="0" kern="1200" dirty="0" smtClean="0">
+              <a:rPr lang="en-US" altLang="zh-CN" sz="1200" b="1" i="0" kern="1200" dirty="0">
                 <a:solidFill>
                   <a:schemeClr val="tx1"/>
                 </a:solidFill>
@@ -2025,7 +2020,7 @@
               <a:t>JS/CSS</a:t>
             </a:r>
             <a:r>
-              <a:rPr lang="zh-CN" altLang="en-US" sz="1200" b="1" i="0" kern="1200" dirty="0" smtClean="0">
+              <a:rPr lang="zh-CN" altLang="en-US" sz="1200" b="1" i="0" kern="1200" dirty="0">
                 <a:solidFill>
                   <a:schemeClr val="tx1"/>
                 </a:solidFill>
@@ -2038,7 +2033,7 @@
             </a:r>
           </a:p>
           <a:p>
-            <a:endParaRPr lang="en-US" altLang="zh-CN" dirty="0" smtClean="0"/>
+            <a:endParaRPr lang="en-US" altLang="zh-CN" dirty="0"/>
           </a:p>
         </p:txBody>
       </p:sp>
@@ -2124,21 +2119,20 @@
           <a:lstStyle/>
           <a:p>
             <a:r>
-              <a:rPr lang="en-US" altLang="zh-CN" dirty="0" smtClean="0"/>
+              <a:rPr lang="en-US" altLang="zh-CN" dirty="0"/>
               <a:t>Gulp</a:t>
             </a:r>
             <a:r>
-              <a:rPr lang="zh-CN" altLang="en-US" baseline="0" dirty="0" smtClean="0"/>
+              <a:rPr lang="zh-CN" altLang="en-US" baseline="0" dirty="0"/>
               <a:t> </a:t>
             </a:r>
-            <a:endParaRPr lang="en-US" altLang="zh-CN" dirty="0" smtClean="0"/>
-          </a:p>
-          <a:p>
-            <a:r>
-              <a:rPr lang="en-US" dirty="0" err="1" smtClean="0"/>
+            <a:endParaRPr lang="en-US" altLang="zh-CN" dirty="0"/>
+          </a:p>
+          <a:p>
+            <a:r>
+              <a:rPr lang="en-US" dirty="0"/>
               <a:t>Webpack</a:t>
             </a:r>
-            <a:endParaRPr lang="en-US" dirty="0"/>
           </a:p>
         </p:txBody>
       </p:sp>
@@ -2224,36 +2218,36 @@
           <a:lstStyle/>
           <a:p>
             <a:r>
-              <a:rPr lang="zh-CN" altLang="en-US" dirty="0" smtClean="0"/>
+              <a:rPr lang="zh-CN" altLang="en-US" dirty="0"/>
               <a:t>介绍一下</a:t>
             </a:r>
             <a:r>
-              <a:rPr lang="en-US" altLang="zh-CN" dirty="0" smtClean="0"/>
+              <a:rPr lang="en-US" altLang="zh-CN" dirty="0"/>
               <a:t>Road</a:t>
             </a:r>
             <a:r>
-              <a:rPr lang="zh-CN" altLang="en-US" dirty="0" smtClean="0"/>
+              <a:rPr lang="zh-CN" altLang="en-US" dirty="0"/>
               <a:t> </a:t>
             </a:r>
             <a:r>
-              <a:rPr lang="en-US" altLang="zh-CN" dirty="0" smtClean="0"/>
+              <a:rPr lang="en-US" altLang="zh-CN" dirty="0"/>
               <a:t>Map</a:t>
             </a:r>
           </a:p>
           <a:p>
-            <a:endParaRPr lang="en-US" dirty="0" smtClean="0"/>
-          </a:p>
-          <a:p>
-            <a:r>
-              <a:rPr lang="en-US" altLang="zh-CN" dirty="0" smtClean="0"/>
+            <a:endParaRPr lang="en-US" dirty="0"/>
+          </a:p>
+          <a:p>
+            <a:r>
+              <a:rPr lang="en-US" altLang="zh-CN" dirty="0"/>
               <a:t>Ask</a:t>
             </a:r>
             <a:r>
-              <a:rPr lang="zh-CN" altLang="en-US" dirty="0" smtClean="0"/>
+              <a:rPr lang="zh-CN" altLang="en-US" dirty="0"/>
               <a:t> </a:t>
             </a:r>
             <a:r>
-              <a:rPr lang="en-US" altLang="zh-CN" dirty="0" smtClean="0"/>
+              <a:rPr lang="en-US" altLang="zh-CN" dirty="0"/>
               <a:t>Dante for help?</a:t>
             </a:r>
             <a:endParaRPr lang="en-US" dirty="0"/>
@@ -7375,14 +7369,11 @@
           <a:lstStyle/>
           <a:p>
             <a:r>
-              <a:rPr lang="en-US" dirty="0" smtClean="0">
+              <a:rPr lang="en-US" dirty="0">
                 <a:latin typeface="Calibri Light" panose="020F0302020204030204" pitchFamily="34" charset="0"/>
               </a:rPr>
               <a:t>Background &amp; Road Map</a:t>
             </a:r>
-            <a:endParaRPr lang="en-US" dirty="0">
-              <a:latin typeface="Calibri Light" panose="020F0302020204030204" pitchFamily="34" charset="0"/>
-            </a:endParaRPr>
           </a:p>
         </p:txBody>
       </p:sp>
@@ -7407,14 +7398,11 @@
           <a:lstStyle/>
           <a:p>
             <a:r>
-              <a:rPr lang="en-US" dirty="0" smtClean="0">
+              <a:rPr lang="en-US" dirty="0">
                 <a:latin typeface="Calibri Light" panose="020F0302020204030204" pitchFamily="34" charset="0"/>
               </a:rPr>
               <a:t>JavaScript Engineering</a:t>
             </a:r>
-            <a:endParaRPr lang="en-US" dirty="0">
-              <a:latin typeface="Calibri Light" panose="020F0302020204030204" pitchFamily="34" charset="0"/>
-            </a:endParaRPr>
           </a:p>
         </p:txBody>
       </p:sp>
@@ -7463,10 +7451,9 @@
           <a:lstStyle/>
           <a:p>
             <a:r>
-              <a:rPr lang="en-US" dirty="0" smtClean="0"/>
-              <a:t>2017.07.06</a:t>
-            </a:r>
-            <a:endParaRPr lang="en-US" dirty="0"/>
+              <a:rPr lang="en-US" dirty="0"/>
+              <a:t>2017.08.06</a:t>
+            </a:r>
           </a:p>
         </p:txBody>
       </p:sp>
@@ -7519,17 +7506,8 @@
               <a:rPr lang="en-US" dirty="0">
                 <a:latin typeface="Calibri Light" panose="020F0302020204030204" pitchFamily="34" charset="0"/>
               </a:rPr>
-              <a:t>Road Map of </a:t>
-            </a:r>
-            <a:r>
-              <a:rPr lang="en-US" dirty="0" smtClean="0">
-                <a:latin typeface="Calibri Light" panose="020F0302020204030204" pitchFamily="34" charset="0"/>
-              </a:rPr>
-              <a:t>Lessons</a:t>
-            </a:r>
-            <a:endParaRPr lang="en-US" dirty="0">
-              <a:latin typeface="Calibri Light" panose="020F0302020204030204" pitchFamily="34" charset="0"/>
-            </a:endParaRPr>
+              <a:t>Road Map of Lessons</a:t>
+            </a:r>
           </a:p>
         </p:txBody>
       </p:sp>
@@ -7557,7 +7535,6 @@
               <a:rPr lang="en-US" dirty="0"/>
               <a:t>2</a:t>
             </a:r>
-            <a:endParaRPr lang="en-US" dirty="0"/>
           </a:p>
         </p:txBody>
       </p:sp>
@@ -7570,7 +7547,7 @@
         <p:spPr>
           <a:xfrm>
             <a:off x="1357313" y="2514600"/>
-            <a:ext cx="9082087" cy="2554545"/>
+            <a:ext cx="9082087" cy="1569660"/>
           </a:xfrm>
           <a:prstGeom prst="rect">
             <a:avLst/>
@@ -7588,9 +7565,18 @@
               <a:buChar char="•"/>
             </a:pPr>
             <a:r>
-              <a:rPr lang="en-US" sz="3200" dirty="0" smtClean="0"/>
-              <a:t>JavaScript Modularize Programing</a:t>
-            </a:r>
+              <a:rPr lang="en-US" sz="3200" dirty="0"/>
+              <a:t>Webpack </a:t>
+            </a:r>
+            <a:r>
+              <a:rPr lang="mr-IN" sz="3200" dirty="0"/>
+              <a:t>–</a:t>
+            </a:r>
+            <a:r>
+              <a:rPr lang="en-US" sz="3200" dirty="0"/>
+              <a:t> Introduction</a:t>
+            </a:r>
+            <a:endParaRPr lang="en-US" sz="3200" dirty="0"/>
           </a:p>
           <a:p>
             <a:pPr marL="285750" indent="-285750">
@@ -7598,15 +7584,15 @@
               <a:buChar char="•"/>
             </a:pPr>
             <a:r>
-              <a:rPr lang="en-US" sz="3200" dirty="0" smtClean="0"/>
+              <a:rPr lang="en-US" sz="3200" dirty="0"/>
               <a:t>Gulp </a:t>
             </a:r>
             <a:r>
-              <a:rPr lang="mr-IN" sz="3200" dirty="0" smtClean="0"/>
+              <a:rPr lang="mr-IN" sz="3200" dirty="0"/>
               <a:t>–</a:t>
             </a:r>
             <a:r>
-              <a:rPr lang="en-US" sz="3200" dirty="0" smtClean="0"/>
+              <a:rPr lang="en-US" sz="3200" dirty="0"/>
               <a:t> Introduction</a:t>
             </a:r>
           </a:p>
@@ -7616,41 +7602,8 @@
               <a:buChar char="•"/>
             </a:pPr>
             <a:r>
-              <a:rPr lang="en-US" sz="3200" dirty="0" err="1" smtClean="0"/>
-              <a:t>Webpack</a:t>
-            </a:r>
-            <a:r>
-              <a:rPr lang="en-US" sz="3200" dirty="0" smtClean="0"/>
-              <a:t> </a:t>
-            </a:r>
-            <a:r>
-              <a:rPr lang="mr-IN" sz="3200" dirty="0" smtClean="0"/>
-              <a:t>–</a:t>
-            </a:r>
-            <a:r>
-              <a:rPr lang="en-US" sz="3200" dirty="0" smtClean="0"/>
-              <a:t> Introduction</a:t>
-            </a:r>
-          </a:p>
-          <a:p>
-            <a:pPr marL="285750" indent="-285750">
-              <a:buFont typeface="Arial" charset="0"/>
-              <a:buChar char="•"/>
-            </a:pPr>
-            <a:endParaRPr lang="en-US" sz="3200" dirty="0" smtClean="0"/>
-          </a:p>
-          <a:p>
-            <a:pPr marL="285750" indent="-285750">
-              <a:buFont typeface="Arial" charset="0"/>
-              <a:buChar char="•"/>
-            </a:pPr>
-            <a:r>
-              <a:rPr lang="en-US" sz="3200" dirty="0" err="1" smtClean="0"/>
-              <a:t>Webpack</a:t>
-            </a:r>
-            <a:r>
-              <a:rPr lang="en-US" sz="3200" dirty="0" smtClean="0"/>
-              <a:t> + Gulp + Angular Example (Step by Step)</a:t>
+              <a:rPr lang="en-US" sz="3200" dirty="0"/>
+              <a:t>webpack + gulp + angularjs Example (Step by Step)</a:t>
             </a:r>
           </a:p>
         </p:txBody>
@@ -7665,13 +7618,6 @@
   <p:clrMapOvr>
     <a:masterClrMapping/>
   </p:clrMapOvr>
-  <p:timing>
-    <p:tnLst>
-      <p:par>
-        <p:cTn id="1" dur="indefinite" restart="never" nodeType="tmRoot"/>
-      </p:par>
-    </p:tnLst>
-  </p:timing>
 </p:sld>
 </file>
 
@@ -7715,7 +7661,7 @@
           <a:lstStyle/>
           <a:p>
             <a:r>
-              <a:rPr lang="en-US" smtClean="0"/>
+              <a:rPr lang="en-US"/>
               <a:t>2.1</a:t>
             </a:r>
             <a:endParaRPr lang="en-US" dirty="0"/>
@@ -7743,13 +7689,13 @@
           <a:lstStyle/>
           <a:p>
             <a:r>
-              <a:rPr lang="en-US" dirty="0" smtClean="0">
+              <a:rPr lang="en-US" dirty="0">
                 <a:latin typeface="Calibri Light" panose="020F0302020204030204" pitchFamily="34" charset="0"/>
               </a:rPr>
               <a:t>Pre - </a:t>
             </a:r>
             <a:r>
-              <a:rPr lang="en-US" dirty="0" err="1" smtClean="0">
+              <a:rPr lang="en-US" dirty="0" err="1">
                 <a:latin typeface="Calibri Light" panose="020F0302020204030204" pitchFamily="34" charset="0"/>
               </a:rPr>
               <a:t>RequireSuites</a:t>
@@ -7776,13 +7722,13 @@
           <a:lstStyle/>
           <a:p>
             <a:r>
-              <a:rPr lang="en-US" dirty="0" err="1" smtClean="0">
+              <a:rPr lang="en-US" dirty="0" err="1">
                 <a:latin typeface="Calibri Light" panose="020F0302020204030204" pitchFamily="34" charset="0"/>
               </a:rPr>
               <a:t>Node.js</a:t>
             </a:r>
             <a:r>
-              <a:rPr lang="en-US" dirty="0" smtClean="0">
+              <a:rPr lang="en-US" dirty="0">
                 <a:latin typeface="Calibri Light" panose="020F0302020204030204" pitchFamily="34" charset="0"/>
               </a:rPr>
               <a:t> v6 + </a:t>
@@ -7790,13 +7736,13 @@
           </a:p>
           <a:p>
             <a:r>
-              <a:rPr lang="en-US" dirty="0" err="1" smtClean="0">
+              <a:rPr lang="en-US" dirty="0" err="1">
                 <a:latin typeface="Calibri Light" panose="020F0302020204030204" pitchFamily="34" charset="0"/>
               </a:rPr>
               <a:t>Npm</a:t>
             </a:r>
             <a:r>
-              <a:rPr lang="en-US" dirty="0" smtClean="0">
+              <a:rPr lang="en-US" dirty="0">
                 <a:latin typeface="Calibri Light" panose="020F0302020204030204" pitchFamily="34" charset="0"/>
               </a:rPr>
               <a:t> / Yarn (if needed, add registry for China network issue)</a:t>
@@ -7804,45 +7750,45 @@
           </a:p>
           <a:p>
             <a:r>
-              <a:rPr lang="en-US" dirty="0" err="1" smtClean="0">
+              <a:rPr lang="en-US" dirty="0" err="1">
                 <a:latin typeface="Calibri Light" panose="020F0302020204030204" pitchFamily="34" charset="0"/>
               </a:rPr>
               <a:t>Git</a:t>
             </a:r>
-            <a:endParaRPr lang="en-US" dirty="0" smtClean="0">
+            <a:endParaRPr lang="en-US" dirty="0">
               <a:latin typeface="Calibri Light" panose="020F0302020204030204" pitchFamily="34" charset="0"/>
             </a:endParaRPr>
           </a:p>
           <a:p>
             <a:r>
-              <a:rPr lang="en-US" dirty="0" err="1" smtClean="0">
+              <a:rPr lang="en-US" dirty="0" err="1">
                 <a:latin typeface="Calibri Light" panose="020F0302020204030204" pitchFamily="34" charset="0"/>
               </a:rPr>
               <a:t>VSCode</a:t>
             </a:r>
-            <a:endParaRPr lang="en-US" dirty="0" smtClean="0">
-              <a:latin typeface="Calibri Light" panose="020F0302020204030204" pitchFamily="34" charset="0"/>
-            </a:endParaRPr>
-          </a:p>
-          <a:p>
             <a:endParaRPr lang="en-US" dirty="0">
               <a:latin typeface="Calibri Light" panose="020F0302020204030204" pitchFamily="34" charset="0"/>
             </a:endParaRPr>
           </a:p>
           <a:p>
-            <a:endParaRPr lang="en-US" dirty="0" smtClean="0">
+            <a:endParaRPr lang="en-US" dirty="0">
               <a:latin typeface="Calibri Light" panose="020F0302020204030204" pitchFamily="34" charset="0"/>
             </a:endParaRPr>
           </a:p>
           <a:p>
-            <a:r>
-              <a:rPr lang="en-US" altLang="zh-CN" dirty="0" err="1" smtClean="0">
+            <a:endParaRPr lang="en-US" dirty="0">
+              <a:latin typeface="Calibri Light" panose="020F0302020204030204" pitchFamily="34" charset="0"/>
+            </a:endParaRPr>
+          </a:p>
+          <a:p>
+            <a:r>
+              <a:rPr lang="en-US" altLang="zh-CN" dirty="0" err="1">
                 <a:latin typeface="Calibri Light" panose="020F0302020204030204" pitchFamily="34" charset="0"/>
               </a:rPr>
               <a:t>Cmder</a:t>
             </a:r>
             <a:r>
-              <a:rPr lang="en-US" altLang="zh-CN" dirty="0" smtClean="0">
+              <a:rPr lang="en-US" altLang="zh-CN" dirty="0">
                 <a:latin typeface="Calibri Light" panose="020F0302020204030204" pitchFamily="34" charset="0"/>
               </a:rPr>
               <a:t>. </a:t>
@@ -7850,20 +7796,17 @@
           </a:p>
           <a:p>
             <a:r>
-              <a:rPr lang="en-US" dirty="0" err="1" smtClean="0">
+              <a:rPr lang="en-US" dirty="0" err="1">
                 <a:latin typeface="Calibri Light" panose="020F0302020204030204" pitchFamily="34" charset="0"/>
               </a:rPr>
               <a:t>Jetbrains</a:t>
             </a:r>
             <a:r>
-              <a:rPr lang="en-US" dirty="0" smtClean="0">
+              <a:rPr lang="en-US" dirty="0">
                 <a:latin typeface="Calibri Light" panose="020F0302020204030204" pitchFamily="34" charset="0"/>
               </a:rPr>
               <a:t> Series IDE</a:t>
             </a:r>
-            <a:endParaRPr lang="en-US" dirty="0">
-              <a:latin typeface="Calibri Light" panose="020F0302020204030204" pitchFamily="34" charset="0"/>
-            </a:endParaRPr>
           </a:p>
         </p:txBody>
       </p:sp>
@@ -7877,13 +7820,6 @@
   <p:clrMapOvr>
     <a:masterClrMapping/>
   </p:clrMapOvr>
-  <p:timing>
-    <p:tnLst>
-      <p:par>
-        <p:cTn id="1" dur="indefinite" restart="never" nodeType="tmRoot"/>
-      </p:par>
-    </p:tnLst>
-  </p:timing>
 </p:sld>
 </file>
 
@@ -7909,13 +7845,6 @@
   <p:clrMapOvr>
     <a:masterClrMapping/>
   </p:clrMapOvr>
-  <p:timing>
-    <p:tnLst>
-      <p:par>
-        <p:cTn id="1" dur="indefinite" restart="never" nodeType="tmRoot"/>
-      </p:par>
-    </p:tnLst>
-  </p:timing>
 </p:sld>
 </file>
 
@@ -7941,13 +7870,6 @@
   <p:clrMapOvr>
     <a:masterClrMapping/>
   </p:clrMapOvr>
-  <p:timing>
-    <p:tnLst>
-      <p:par>
-        <p:cTn id="1" dur="indefinite" restart="never" nodeType="tmRoot"/>
-      </p:par>
-    </p:tnLst>
-  </p:timing>
 </p:sld>
 </file>
 
@@ -7989,7 +7911,7 @@
           <a:lstStyle/>
           <a:p>
             <a:r>
-              <a:rPr lang="en-US" altLang="zh-CN" dirty="0" smtClean="0">
+              <a:rPr lang="en-US" altLang="zh-CN" dirty="0">
                 <a:latin typeface="Calibri Light" panose="020F0302020204030204" pitchFamily="34" charset="0"/>
               </a:rPr>
               <a:t>Toc</a:t>
@@ -8075,14 +7997,11 @@
           <a:lstStyle/>
           <a:p>
             <a:r>
-              <a:rPr lang="en-US" dirty="0" smtClean="0">
+              <a:rPr lang="en-US" dirty="0">
                 <a:latin typeface="Calibri Light" panose="020F0302020204030204" pitchFamily="34" charset="0"/>
               </a:rPr>
               <a:t>Engineering Background</a:t>
             </a:r>
-            <a:endParaRPr lang="en-US" dirty="0">
-              <a:latin typeface="Calibri Light" panose="020F0302020204030204" pitchFamily="34" charset="0"/>
-            </a:endParaRPr>
           </a:p>
         </p:txBody>
       </p:sp>
@@ -8107,14 +8026,11 @@
           <a:lstStyle/>
           <a:p>
             <a:r>
-              <a:rPr lang="en-US" dirty="0" smtClean="0">
+              <a:rPr lang="en-US" dirty="0">
                 <a:latin typeface="Calibri Light" panose="020F0302020204030204" pitchFamily="34" charset="0"/>
               </a:rPr>
               <a:t>Road Map of Lessons</a:t>
             </a:r>
-            <a:endParaRPr lang="en-US" dirty="0">
-              <a:latin typeface="Calibri Light" panose="020F0302020204030204" pitchFamily="34" charset="0"/>
-            </a:endParaRPr>
           </a:p>
         </p:txBody>
       </p:sp>
@@ -8123,13 +8039,6 @@
   <p:clrMapOvr>
     <a:masterClrMapping/>
   </p:clrMapOvr>
-  <p:timing>
-    <p:tnLst>
-      <p:par>
-        <p:cTn id="1" dur="indefinite" restart="never" nodeType="tmRoot"/>
-      </p:par>
-    </p:tnLst>
-  </p:timing>
 </p:sld>
 </file>
 
@@ -8174,17 +8083,8 @@
               <a:rPr lang="en-US" dirty="0">
                 <a:latin typeface="Calibri Light" panose="020F0302020204030204" pitchFamily="34" charset="0"/>
               </a:rPr>
-              <a:t>Engineering </a:t>
-            </a:r>
-            <a:r>
-              <a:rPr lang="en-US" dirty="0" smtClean="0">
-                <a:latin typeface="Calibri Light" panose="020F0302020204030204" pitchFamily="34" charset="0"/>
-              </a:rPr>
-              <a:t>Background</a:t>
-            </a:r>
-            <a:endParaRPr lang="en-US" dirty="0">
-              <a:latin typeface="Calibri Light" panose="020F0302020204030204" pitchFamily="34" charset="0"/>
-            </a:endParaRPr>
+              <a:t>Engineering Background</a:t>
+            </a:r>
           </a:p>
         </p:txBody>
       </p:sp>
@@ -8242,7 +8142,7 @@
               <a:buChar char="•"/>
             </a:pPr>
             <a:r>
-              <a:rPr lang="en-US" altLang="zh-CN" sz="2800" dirty="0" smtClean="0"/>
+              <a:rPr lang="en-US" altLang="zh-CN" sz="2800" dirty="0"/>
               <a:t>Importance of web application develop engineering</a:t>
             </a:r>
           </a:p>
@@ -8252,10 +8152,9 @@
               <a:buChar char="•"/>
             </a:pPr>
             <a:r>
-              <a:rPr lang="en-US" sz="2800" dirty="0" smtClean="0"/>
+              <a:rPr lang="en-US" sz="2800" dirty="0"/>
               <a:t>Compare with java server side web application</a:t>
             </a:r>
-            <a:endParaRPr lang="en-US" sz="2800" dirty="0"/>
           </a:p>
         </p:txBody>
       </p:sp>
@@ -8264,13 +8163,6 @@
   <p:clrMapOvr>
     <a:masterClrMapping/>
   </p:clrMapOvr>
-  <p:timing>
-    <p:tnLst>
-      <p:par>
-        <p:cTn id="1" dur="indefinite" restart="never" nodeType="tmRoot"/>
-      </p:par>
-    </p:tnLst>
-  </p:timing>
 </p:sld>
 </file>
 
@@ -8314,10 +8206,9 @@
           <a:lstStyle/>
           <a:p>
             <a:r>
-              <a:rPr lang="en-US" dirty="0" smtClean="0"/>
+              <a:rPr lang="en-US" dirty="0"/>
               <a:t>1.1</a:t>
             </a:r>
-            <a:endParaRPr lang="en-US" dirty="0"/>
           </a:p>
         </p:txBody>
       </p:sp>
@@ -8344,23 +8235,15 @@
           <a:lstStyle/>
           <a:p>
             <a:r>
-              <a:rPr lang="en-US" altLang="zh-CN" b="0" dirty="0" smtClean="0">
+              <a:rPr lang="en-US" altLang="zh-CN" b="0" dirty="0">
                 <a:latin typeface="Calibri Light" charset="0"/>
                 <a:ea typeface="Calibri Light" charset="0"/>
                 <a:cs typeface="Calibri Light" charset="0"/>
               </a:rPr>
-              <a:t>Background</a:t>
-            </a:r>
-            <a:r>
-              <a:rPr lang="en-US" altLang="zh-CN" b="0" dirty="0" smtClean="0">
-                <a:latin typeface="Calibri Light" charset="0"/>
-                <a:ea typeface="Calibri Light" charset="0"/>
-                <a:cs typeface="Calibri Light" charset="0"/>
-              </a:rPr>
-              <a:t>:</a:t>
-            </a:r>
-            <a:r>
-              <a:rPr lang="zh-CN" altLang="en-US" b="0" dirty="0" smtClean="0">
+              <a:t>Background:</a:t>
+            </a:r>
+            <a:r>
+              <a:rPr lang="zh-CN" altLang="en-US" b="0" dirty="0">
                 <a:latin typeface="Calibri Light" charset="0"/>
                 <a:ea typeface="Calibri Light" charset="0"/>
                 <a:cs typeface="Calibri Light" charset="0"/>
@@ -8405,24 +8288,12 @@
               <a:buNone/>
             </a:pPr>
             <a:r>
-              <a:rPr lang="en-US" dirty="0" smtClean="0">
-                <a:latin typeface="Calibri Light" charset="0"/>
-                <a:ea typeface="Calibri Light" charset="0"/>
-                <a:cs typeface="Calibri Light" charset="0"/>
-              </a:rPr>
-              <a:t>Google </a:t>
-            </a:r>
-            <a:r>
               <a:rPr lang="en-US" dirty="0">
                 <a:latin typeface="Calibri Light" charset="0"/>
                 <a:ea typeface="Calibri Light" charset="0"/>
                 <a:cs typeface="Calibri Light" charset="0"/>
               </a:rPr>
-              <a:t>found that] the page with 10 results took 0.4 seconds to generate. The page with 30 results took 0.9 seconds. Half a second delay caused a 20% drop in traffic. Half a second delay killed user satisfaction.</a:t>
-            </a:r>
-            <a:r>
-              <a:rPr lang="en-US" dirty="0"/>
-              <a:t/>
+              <a:t>Google found that the page with 10 results took 0.4 seconds to generate. The page with 30 results took 0.9 seconds. Half a second delay caused a 20% drop in traffic. Half a second delay killed user satisfaction.</a:t>
             </a:r>
             <a:br>
               <a:rPr lang="en-US" dirty="0"/>
@@ -8741,10 +8612,9 @@
           <a:lstStyle/>
           <a:p>
             <a:r>
-              <a:rPr lang="en-US" dirty="0" smtClean="0"/>
+              <a:rPr lang="en-US" dirty="0"/>
               <a:t>1.1</a:t>
             </a:r>
-            <a:endParaRPr lang="en-US" dirty="0"/>
           </a:p>
         </p:txBody>
       </p:sp>
@@ -8771,23 +8641,15 @@
           <a:lstStyle/>
           <a:p>
             <a:r>
-              <a:rPr lang="en-US" altLang="zh-CN" b="0" dirty="0" smtClean="0">
+              <a:rPr lang="en-US" altLang="zh-CN" b="0" dirty="0">
                 <a:latin typeface="Calibri Light" charset="0"/>
                 <a:ea typeface="Calibri Light" charset="0"/>
                 <a:cs typeface="Calibri Light" charset="0"/>
               </a:rPr>
-              <a:t>Background</a:t>
-            </a:r>
-            <a:r>
-              <a:rPr lang="en-US" altLang="zh-CN" b="0" dirty="0" smtClean="0">
-                <a:latin typeface="Calibri Light" charset="0"/>
-                <a:ea typeface="Calibri Light" charset="0"/>
-                <a:cs typeface="Calibri Light" charset="0"/>
-              </a:rPr>
-              <a:t>:</a:t>
-            </a:r>
-            <a:r>
-              <a:rPr lang="zh-CN" altLang="en-US" b="0" dirty="0" smtClean="0">
+              <a:t>Background:</a:t>
+            </a:r>
+            <a:r>
+              <a:rPr lang="zh-CN" altLang="en-US" b="0" dirty="0">
                 <a:latin typeface="Calibri Light" charset="0"/>
                 <a:ea typeface="Calibri Light" charset="0"/>
                 <a:cs typeface="Calibri Light" charset="0"/>
@@ -8834,13 +8696,8 @@
           <a:p>
             <a:r>
               <a:rPr lang="en-US" sz="3600" dirty="0"/>
-              <a:t>Stack Overflow: The Architecture - 2016 </a:t>
-            </a:r>
-            <a:r>
-              <a:rPr lang="en-US" sz="3600" dirty="0" smtClean="0"/>
-              <a:t>Edition</a:t>
-            </a:r>
-            <a:endParaRPr lang="en-US" sz="3600" dirty="0"/>
+              <a:t>Stack Overflow: The Architecture - 2016 Edition</a:t>
+            </a:r>
           </a:p>
         </p:txBody>
       </p:sp>
@@ -8906,18 +8763,17 @@
               <a:defRPr/>
             </a:pPr>
             <a:r>
-              <a:rPr lang="en-US" dirty="0" smtClean="0"/>
+              <a:rPr lang="en-US" dirty="0"/>
               <a:t>Why </a:t>
             </a:r>
             <a:r>
-              <a:rPr lang="en-US" dirty="0" err="1" smtClean="0"/>
+              <a:rPr lang="en-US" dirty="0" err="1"/>
               <a:t>stackoverflow</a:t>
             </a:r>
             <a:r>
-              <a:rPr lang="en-US" dirty="0" smtClean="0"/>
+              <a:rPr lang="en-US" dirty="0"/>
               <a:t> use 11 servers and 4 load-balance server to serve for over 6M users easily?</a:t>
             </a:r>
-            <a:endParaRPr lang="en-US" dirty="0"/>
           </a:p>
         </p:txBody>
       </p:sp>
@@ -8931,13 +8787,6 @@
   <p:clrMapOvr>
     <a:masterClrMapping/>
   </p:clrMapOvr>
-  <p:timing>
-    <p:tnLst>
-      <p:par>
-        <p:cTn id="1" dur="indefinite" restart="never" nodeType="tmRoot"/>
-      </p:par>
-    </p:tnLst>
-  </p:timing>
 </p:sld>
 </file>
 
@@ -8981,10 +8830,9 @@
           <a:lstStyle/>
           <a:p>
             <a:r>
-              <a:rPr lang="en-US" dirty="0" smtClean="0"/>
+              <a:rPr lang="en-US" dirty="0"/>
               <a:t>1.1</a:t>
             </a:r>
-            <a:endParaRPr lang="en-US" dirty="0"/>
           </a:p>
         </p:txBody>
       </p:sp>
@@ -9011,23 +8859,15 @@
           <a:lstStyle/>
           <a:p>
             <a:r>
-              <a:rPr lang="en-US" altLang="zh-CN" b="0" dirty="0" smtClean="0">
+              <a:rPr lang="en-US" altLang="zh-CN" b="0" dirty="0">
                 <a:latin typeface="Calibri Light" charset="0"/>
                 <a:ea typeface="Calibri Light" charset="0"/>
                 <a:cs typeface="Calibri Light" charset="0"/>
               </a:rPr>
-              <a:t>Background</a:t>
-            </a:r>
-            <a:r>
-              <a:rPr lang="en-US" altLang="zh-CN" b="0" dirty="0" smtClean="0">
-                <a:latin typeface="Calibri Light" charset="0"/>
-                <a:ea typeface="Calibri Light" charset="0"/>
-                <a:cs typeface="Calibri Light" charset="0"/>
-              </a:rPr>
-              <a:t>:</a:t>
-            </a:r>
-            <a:r>
-              <a:rPr lang="zh-CN" altLang="en-US" b="0" dirty="0" smtClean="0">
+              <a:t>Background:</a:t>
+            </a:r>
+            <a:r>
+              <a:rPr lang="zh-CN" altLang="en-US" b="0" dirty="0">
                 <a:latin typeface="Calibri Light" charset="0"/>
                 <a:ea typeface="Calibri Light" charset="0"/>
                 <a:cs typeface="Calibri Light" charset="0"/>
@@ -9181,7 +9021,7 @@
               </a:spcBef>
               <a:buNone/>
             </a:pPr>
-            <a:endParaRPr lang="en-US" altLang="zh-CN" dirty="0" smtClean="0">
+            <a:endParaRPr lang="en-US" altLang="zh-CN" dirty="0">
               <a:latin typeface="Calibri Light" panose="020F0302020204030204" pitchFamily="34" charset="0"/>
             </a:endParaRPr>
           </a:p>
@@ -9194,16 +9034,8 @@
               <a:buChar char="-"/>
             </a:pPr>
             <a:r>
-              <a:rPr lang="en-US" sz="2000" dirty="0" smtClean="0"/>
-              <a:t>Put </a:t>
-            </a:r>
-            <a:r>
               <a:rPr lang="en-US" sz="2000" dirty="0"/>
-              <a:t>Stylesheets at the </a:t>
-            </a:r>
-            <a:r>
-              <a:rPr lang="en-US" sz="2000" dirty="0" smtClean="0"/>
-              <a:t>Top</a:t>
+              <a:t>Put Stylesheets at the Top</a:t>
             </a:r>
           </a:p>
           <a:p>
@@ -9216,13 +9048,8 @@
             </a:pPr>
             <a:r>
               <a:rPr lang="en-US" sz="2000" dirty="0"/>
-              <a:t>Put Scripts at the </a:t>
-            </a:r>
-            <a:r>
-              <a:rPr lang="en-US" sz="2000" dirty="0" smtClean="0"/>
-              <a:t>Bottom</a:t>
-            </a:r>
-            <a:endParaRPr lang="en-US" sz="2000" dirty="0"/>
+              <a:t>Put Scripts at the Bottom</a:t>
+            </a:r>
           </a:p>
           <a:p>
             <a:pPr>
@@ -9234,11 +9061,7 @@
             </a:pPr>
             <a:r>
               <a:rPr lang="en-US" sz="2000" dirty="0"/>
-              <a:t>Make JavaScript and CSS </a:t>
-            </a:r>
-            <a:r>
-              <a:rPr lang="en-US" sz="2000" dirty="0" smtClean="0"/>
-              <a:t>External</a:t>
+              <a:t>Make JavaScript and CSS External</a:t>
             </a:r>
           </a:p>
           <a:p>
@@ -9251,13 +9074,8 @@
             </a:pPr>
             <a:r>
               <a:rPr lang="en-US" sz="2000" dirty="0"/>
-              <a:t>Minify JavaScript and </a:t>
-            </a:r>
-            <a:r>
-              <a:rPr lang="en-US" sz="2000" dirty="0" smtClean="0"/>
-              <a:t>CSS</a:t>
-            </a:r>
-            <a:endParaRPr lang="en-US" sz="2000" dirty="0"/>
+              <a:t>Minify JavaScript and CSS</a:t>
+            </a:r>
           </a:p>
           <a:p>
             <a:pPr>
@@ -9269,13 +9087,8 @@
             </a:pPr>
             <a:r>
               <a:rPr lang="en-US" sz="2000" dirty="0"/>
-              <a:t>Minimize HTTP </a:t>
-            </a:r>
-            <a:r>
-              <a:rPr lang="en-US" sz="2000" dirty="0" smtClean="0"/>
-              <a:t>Requests</a:t>
-            </a:r>
-            <a:endParaRPr lang="en-US" sz="2000" dirty="0"/>
+              <a:t>Minimize HTTP Requests</a:t>
+            </a:r>
           </a:p>
           <a:p>
             <a:pPr>
@@ -9286,23 +9099,15 @@
               <a:buChar char="-"/>
             </a:pPr>
             <a:r>
-              <a:rPr lang="en-US" sz="2000" dirty="0" smtClean="0"/>
-              <a:t>Use </a:t>
-            </a:r>
-            <a:r>
               <a:rPr lang="en-US" sz="2000" dirty="0"/>
-              <a:t>a Content Delivery </a:t>
-            </a:r>
-            <a:r>
-              <a:rPr lang="en-US" sz="2000" dirty="0" smtClean="0"/>
-              <a:t>Network</a:t>
-            </a:r>
-            <a:r>
-              <a:rPr lang="zh-CN" altLang="en-US" sz="2000" dirty="0" smtClean="0"/>
+              <a:t>Use a Content Delivery Network</a:t>
+            </a:r>
+            <a:r>
+              <a:rPr lang="zh-CN" altLang="en-US" sz="2000" dirty="0"/>
               <a:t> </a:t>
             </a:r>
             <a:r>
-              <a:rPr lang="en-US" altLang="zh-CN" sz="2000" dirty="0" smtClean="0"/>
+              <a:rPr lang="en-US" altLang="zh-CN" sz="2000" dirty="0"/>
               <a:t>(server-side)</a:t>
             </a:r>
           </a:p>
@@ -9316,13 +9121,8 @@
             </a:pPr>
             <a:r>
               <a:rPr lang="en-US" sz="2000" dirty="0"/>
-              <a:t>Reduce DNS </a:t>
-            </a:r>
-            <a:r>
-              <a:rPr lang="en-US" sz="2000" dirty="0" smtClean="0"/>
-              <a:t>Lookups</a:t>
-            </a:r>
-            <a:endParaRPr lang="en-US" sz="2000" dirty="0"/>
+              <a:t>Reduce DNS Lookups</a:t>
+            </a:r>
           </a:p>
           <a:p>
             <a:pPr>
@@ -9333,18 +9133,9 @@
               <a:buChar char="-"/>
             </a:pPr>
             <a:r>
-              <a:rPr lang="en-US" sz="2000" dirty="0" smtClean="0"/>
-              <a:t>Add </a:t>
-            </a:r>
-            <a:r>
               <a:rPr lang="en-US" sz="2000" dirty="0"/>
-              <a:t>an Expires or a Cache-Control </a:t>
-            </a:r>
-            <a:r>
-              <a:rPr lang="en-US" sz="2000" dirty="0" smtClean="0"/>
-              <a:t>Header (server-side)</a:t>
-            </a:r>
-            <a:endParaRPr lang="en-US" sz="2000" dirty="0"/>
+              <a:t>Add an Expires or a Cache-Control Header (server-side)</a:t>
+            </a:r>
           </a:p>
           <a:p>
             <a:pPr>
@@ -9355,11 +9146,11 @@
               <a:buChar char="-"/>
             </a:pPr>
             <a:r>
-              <a:rPr lang="en-US" sz="2000" dirty="0" err="1" smtClean="0"/>
+              <a:rPr lang="en-US" sz="2000" dirty="0" err="1"/>
               <a:t>Gzip</a:t>
             </a:r>
             <a:r>
-              <a:rPr lang="en-US" sz="2000" dirty="0" smtClean="0"/>
+              <a:rPr lang="en-US" sz="2000" dirty="0"/>
               <a:t> Components (server-side)</a:t>
             </a:r>
           </a:p>
@@ -9372,20 +9163,17 @@
               <a:buChar char="-"/>
             </a:pPr>
             <a:r>
-              <a:rPr lang="mr-IN" dirty="0" smtClean="0">
+              <a:rPr lang="mr-IN" dirty="0">
                 <a:latin typeface="Calibri Light" panose="020F0302020204030204" pitchFamily="34" charset="0"/>
               </a:rPr>
               <a:t>……</a:t>
             </a:r>
             <a:r>
-              <a:rPr lang="en-US" dirty="0" smtClean="0">
+              <a:rPr lang="en-US" dirty="0">
                 <a:latin typeface="Calibri Light" panose="020F0302020204030204" pitchFamily="34" charset="0"/>
               </a:rPr>
               <a:t>.</a:t>
             </a:r>
-            <a:endParaRPr lang="en-US" dirty="0">
-              <a:latin typeface="Calibri Light" panose="020F0302020204030204" pitchFamily="34" charset="0"/>
-            </a:endParaRPr>
           </a:p>
           <a:p>
             <a:pPr marL="0" marR="0" lvl="0" indent="0" defTabSz="914400" eaLnBrk="1" fontAlgn="auto" latinLnBrk="0" hangingPunct="1">
@@ -9445,13 +9233,6 @@
   <p:clrMapOvr>
     <a:masterClrMapping/>
   </p:clrMapOvr>
-  <p:timing>
-    <p:tnLst>
-      <p:par>
-        <p:cTn id="1" dur="indefinite" restart="never" nodeType="tmRoot"/>
-      </p:par>
-    </p:tnLst>
-  </p:timing>
 </p:sld>
 </file>
 
@@ -9493,7 +9274,7 @@
           <a:lstStyle/>
           <a:p>
             <a:r>
-              <a:rPr lang="en-US" dirty="0" smtClean="0">
+              <a:rPr lang="en-US" dirty="0">
                 <a:latin typeface="Calibri Light" panose="020F0302020204030204" pitchFamily="34" charset="0"/>
               </a:rPr>
               <a:t>Question:</a:t>
@@ -9506,14 +9287,11 @@
           </a:p>
           <a:p>
             <a:r>
-              <a:rPr lang="en-US" dirty="0" smtClean="0">
+              <a:rPr lang="en-US" dirty="0">
                 <a:latin typeface="Calibri Light" panose="020F0302020204030204" pitchFamily="34" charset="0"/>
               </a:rPr>
               <a:t>So, What can engineering help building optimized web application?</a:t>
             </a:r>
-            <a:endParaRPr lang="en-US" dirty="0">
-              <a:latin typeface="Calibri Light" panose="020F0302020204030204" pitchFamily="34" charset="0"/>
-            </a:endParaRPr>
           </a:p>
         </p:txBody>
       </p:sp>
@@ -9527,13 +9305,6 @@
   <p:clrMapOvr>
     <a:masterClrMapping/>
   </p:clrMapOvr>
-  <p:timing>
-    <p:tnLst>
-      <p:par>
-        <p:cTn id="1" dur="indefinite" restart="never" nodeType="tmRoot"/>
-      </p:par>
-    </p:tnLst>
-  </p:timing>
 </p:sld>
 </file>
 
@@ -9647,7 +9418,7 @@
           <a:lstStyle/>
           <a:p>
             <a:r>
-              <a:rPr lang="en-US" b="0" dirty="0" smtClean="0">
+              <a:rPr lang="en-US" b="0" dirty="0">
                 <a:latin typeface="Calibri Light" charset="0"/>
                 <a:ea typeface="Calibri Light" charset="0"/>
                 <a:cs typeface="Calibri Light" charset="0"/>
@@ -9655,7 +9426,7 @@
               <a:t>Background:</a:t>
             </a:r>
             <a:r>
-              <a:rPr lang="zh-CN" altLang="en-US" b="0" dirty="0" smtClean="0">
+              <a:rPr lang="zh-CN" altLang="en-US" b="0" dirty="0">
                 <a:latin typeface="Calibri Light" charset="0"/>
                 <a:ea typeface="Calibri Light" charset="0"/>
                 <a:cs typeface="Calibri Light" charset="0"/>
@@ -9663,7 +9434,7 @@
               <a:t> </a:t>
             </a:r>
             <a:r>
-              <a:rPr lang="en-US" altLang="zh-CN" b="0" dirty="0" smtClean="0">
+              <a:rPr lang="en-US" altLang="zh-CN" b="0" dirty="0">
                 <a:latin typeface="Calibri Light" charset="0"/>
                 <a:ea typeface="Calibri Light" charset="0"/>
                 <a:cs typeface="Calibri Light" charset="0"/>
@@ -9671,7 +9442,7 @@
               <a:t>Introduction Engineering in JavaScript</a:t>
             </a:r>
             <a:r>
-              <a:rPr lang="zh-CN" altLang="en-US" b="0" dirty="0" smtClean="0">
+              <a:rPr lang="zh-CN" altLang="en-US" b="0" dirty="0">
                 <a:latin typeface="Calibri Light" charset="0"/>
                 <a:ea typeface="Calibri Light" charset="0"/>
                 <a:cs typeface="Calibri Light" charset="0"/>
@@ -9679,18 +9450,13 @@
               <a:t> </a:t>
             </a:r>
             <a:r>
-              <a:rPr lang="en-US" b="0" dirty="0" smtClean="0">
+              <a:rPr lang="en-US" b="0" dirty="0">
                 <a:latin typeface="Calibri Light" charset="0"/>
                 <a:ea typeface="Calibri Light" charset="0"/>
                 <a:cs typeface="Calibri Light" charset="0"/>
               </a:rPr>
               <a:t> </a:t>
             </a:r>
-            <a:endParaRPr lang="en-US" b="0" dirty="0">
-              <a:latin typeface="Calibri Light" charset="0"/>
-              <a:ea typeface="Calibri Light" charset="0"/>
-              <a:cs typeface="Calibri Light" charset="0"/>
-            </a:endParaRPr>
           </a:p>
         </p:txBody>
       </p:sp>
@@ -9727,7 +9493,7 @@
               <a:defRPr/>
             </a:pPr>
             <a:r>
-              <a:rPr lang="en-US" altLang="zh-CN" sz="3200" dirty="0" smtClean="0">
+              <a:rPr lang="en-US" altLang="zh-CN" sz="3200" dirty="0">
                 <a:latin typeface="Calibri" charset="0"/>
                 <a:ea typeface="Calibri" charset="0"/>
                 <a:cs typeface="Calibri" charset="0"/>
@@ -9735,7 +9501,7 @@
               <a:t>3</a:t>
             </a:r>
             <a:r>
-              <a:rPr lang="zh-CN" altLang="en-US" sz="3200" dirty="0" smtClean="0">
+              <a:rPr lang="zh-CN" altLang="en-US" sz="3200" dirty="0">
                 <a:latin typeface="Calibri" charset="0"/>
                 <a:ea typeface="Calibri" charset="0"/>
                 <a:cs typeface="Calibri" charset="0"/>
@@ -9743,14 +9509,14 @@
               <a:t> </a:t>
             </a:r>
             <a:r>
-              <a:rPr lang="en-US" altLang="zh-CN" sz="3200" dirty="0" smtClean="0">
+              <a:rPr lang="en-US" altLang="zh-CN" sz="3200" dirty="0">
                 <a:latin typeface="Calibri" charset="0"/>
                 <a:ea typeface="Calibri" charset="0"/>
                 <a:cs typeface="Calibri" charset="0"/>
               </a:rPr>
               <a:t>Steps in Frontend Engineering.</a:t>
             </a:r>
-            <a:endParaRPr lang="en-US" dirty="0" smtClean="0">
+            <a:endParaRPr lang="en-US" dirty="0">
               <a:latin typeface="Calibri Light" panose="020F0302020204030204" pitchFamily="34" charset="0"/>
             </a:endParaRPr>
           </a:p>
@@ -9773,13 +9539,13 @@
               <a:defRPr/>
             </a:pPr>
             <a:r>
-              <a:rPr lang="en-US" dirty="0" smtClean="0">
+              <a:rPr lang="en-US" dirty="0">
                 <a:latin typeface="Calibri Light" panose="020F0302020204030204" pitchFamily="34" charset="0"/>
               </a:rPr>
               <a:t>Main Framework Tech Selection</a:t>
             </a:r>
             <a:br>
-              <a:rPr lang="en-US" dirty="0" smtClean="0">
+              <a:rPr lang="en-US" dirty="0">
                 <a:latin typeface="Calibri Light" panose="020F0302020204030204" pitchFamily="34" charset="0"/>
               </a:rPr>
             </a:br>
@@ -9806,83 +9572,11 @@
               <a:defRPr/>
             </a:pPr>
             <a:r>
-              <a:rPr lang="en-US" dirty="0" smtClean="0">
+              <a:rPr lang="en-US" dirty="0">
                 <a:latin typeface="Calibri Light" panose="020F0302020204030204" pitchFamily="34" charset="0"/>
               </a:rPr>
               <a:t>Build Flow Optimize</a:t>
             </a:r>
-          </a:p>
-          <a:p>
-            <a:pPr marL="457200" marR="0" lvl="0" indent="-457200" defTabSz="914400" eaLnBrk="1" fontAlgn="auto" latinLnBrk="0" hangingPunct="1">
-              <a:lnSpc>
-                <a:spcPct val="100000"/>
-              </a:lnSpc>
-              <a:spcBef>
-                <a:spcPts val="0"/>
-              </a:spcBef>
-              <a:spcAft>
-                <a:spcPts val="0"/>
-              </a:spcAft>
-              <a:buClrTx/>
-              <a:buSzTx/>
-              <a:buFontTx/>
-              <a:buAutoNum type="arabicPeriod"/>
-              <a:tabLst/>
-              <a:defRPr/>
-            </a:pPr>
-            <a:endParaRPr lang="en-US" dirty="0" smtClean="0">
-              <a:latin typeface="Calibri Light" panose="020F0302020204030204" pitchFamily="34" charset="0"/>
-            </a:endParaRPr>
-          </a:p>
-          <a:p>
-            <a:pPr marL="457200" marR="0" lvl="0" indent="-457200" defTabSz="914400" eaLnBrk="1" fontAlgn="auto" latinLnBrk="0" hangingPunct="1">
-              <a:lnSpc>
-                <a:spcPct val="100000"/>
-              </a:lnSpc>
-              <a:spcBef>
-                <a:spcPts val="0"/>
-              </a:spcBef>
-              <a:spcAft>
-                <a:spcPts val="0"/>
-              </a:spcAft>
-              <a:buClrTx/>
-              <a:buSzTx/>
-              <a:buFontTx/>
-              <a:buAutoNum type="arabicPeriod"/>
-              <a:tabLst/>
-              <a:defRPr/>
-            </a:pPr>
-            <a:r>
-              <a:rPr lang="en-US" dirty="0" smtClean="0">
-                <a:latin typeface="Calibri Light" panose="020F0302020204030204" pitchFamily="34" charset="0"/>
-              </a:rPr>
-              <a:t>JS/CSS Modularize Development</a:t>
-            </a:r>
-            <a:endParaRPr lang="en-US" dirty="0">
-              <a:latin typeface="Calibri Light" panose="020F0302020204030204" pitchFamily="34" charset="0"/>
-            </a:endParaRPr>
-          </a:p>
-          <a:p>
-            <a:pPr marL="457200" marR="0" lvl="0" indent="-457200" defTabSz="914400" eaLnBrk="1" fontAlgn="auto" latinLnBrk="0" hangingPunct="1">
-              <a:lnSpc>
-                <a:spcPct val="100000"/>
-              </a:lnSpc>
-              <a:spcBef>
-                <a:spcPts val="0"/>
-              </a:spcBef>
-              <a:spcAft>
-                <a:spcPts val="0"/>
-              </a:spcAft>
-              <a:buClrTx/>
-              <a:buSzTx/>
-              <a:buFontTx/>
-              <a:buAutoNum type="arabicPeriod"/>
-              <a:tabLst/>
-              <a:defRPr/>
-            </a:pPr>
-            <a:endParaRPr lang="en-US" dirty="0" smtClean="0">
-              <a:latin typeface="Calibri Light" panose="020F0302020204030204" pitchFamily="34" charset="0"/>
-            </a:endParaRPr>
           </a:p>
           <a:p>
             <a:pPr marL="457200" marR="0" lvl="0" indent="-457200" defTabSz="914400" eaLnBrk="1" fontAlgn="auto" latinLnBrk="0" hangingPunct="1">
@@ -9924,9 +9618,12 @@
               <a:tabLst/>
               <a:defRPr/>
             </a:pPr>
-            <a:endParaRPr lang="en-US" dirty="0">
-              <a:latin typeface="Calibri Light" panose="020F0302020204030204" pitchFamily="34" charset="0"/>
-            </a:endParaRPr>
+            <a:r>
+              <a:rPr lang="en-US" dirty="0">
+                <a:latin typeface="Calibri Light" panose="020F0302020204030204" pitchFamily="34" charset="0"/>
+              </a:rPr>
+              <a:t>JS/CSS Modularize Development</a:t>
+            </a:r>
           </a:p>
           <a:p>
             <a:pPr marL="457200" marR="0" lvl="0" indent="-457200" defTabSz="914400" eaLnBrk="1" fontAlgn="auto" latinLnBrk="0" hangingPunct="1">
@@ -9946,7 +9643,73 @@
               <a:tabLst/>
               <a:defRPr/>
             </a:pPr>
-            <a:endParaRPr lang="en-US" dirty="0" smtClean="0">
+            <a:endParaRPr lang="en-US" dirty="0">
+              <a:latin typeface="Calibri Light" panose="020F0302020204030204" pitchFamily="34" charset="0"/>
+            </a:endParaRPr>
+          </a:p>
+          <a:p>
+            <a:pPr marL="457200" marR="0" lvl="0" indent="-457200" defTabSz="914400" eaLnBrk="1" fontAlgn="auto" latinLnBrk="0" hangingPunct="1">
+              <a:lnSpc>
+                <a:spcPct val="100000"/>
+              </a:lnSpc>
+              <a:spcBef>
+                <a:spcPts val="0"/>
+              </a:spcBef>
+              <a:spcAft>
+                <a:spcPts val="0"/>
+              </a:spcAft>
+              <a:buClrTx/>
+              <a:buSzTx/>
+              <a:buFontTx/>
+              <a:buAutoNum type="arabicPeriod"/>
+              <a:tabLst/>
+              <a:defRPr/>
+            </a:pPr>
+            <a:endParaRPr lang="en-US" dirty="0">
+              <a:latin typeface="Calibri Light" panose="020F0302020204030204" pitchFamily="34" charset="0"/>
+            </a:endParaRPr>
+          </a:p>
+          <a:p>
+            <a:pPr marL="457200" marR="0" lvl="0" indent="-457200" defTabSz="914400" eaLnBrk="1" fontAlgn="auto" latinLnBrk="0" hangingPunct="1">
+              <a:lnSpc>
+                <a:spcPct val="100000"/>
+              </a:lnSpc>
+              <a:spcBef>
+                <a:spcPts val="0"/>
+              </a:spcBef>
+              <a:spcAft>
+                <a:spcPts val="0"/>
+              </a:spcAft>
+              <a:buClrTx/>
+              <a:buSzTx/>
+              <a:buFontTx/>
+              <a:buAutoNum type="arabicPeriod"/>
+              <a:tabLst/>
+              <a:defRPr/>
+            </a:pPr>
+            <a:endParaRPr lang="en-US" dirty="0">
+              <a:latin typeface="Calibri Light" panose="020F0302020204030204" pitchFamily="34" charset="0"/>
+            </a:endParaRPr>
+          </a:p>
+          <a:p>
+            <a:pPr marL="457200" marR="0" lvl="0" indent="-457200" defTabSz="914400" eaLnBrk="1" fontAlgn="auto" latinLnBrk="0" hangingPunct="1">
+              <a:lnSpc>
+                <a:spcPct val="100000"/>
+              </a:lnSpc>
+              <a:spcBef>
+                <a:spcPts val="0"/>
+              </a:spcBef>
+              <a:spcAft>
+                <a:spcPts val="0"/>
+              </a:spcAft>
+              <a:buClrTx/>
+              <a:buSzTx/>
+              <a:buFontTx/>
+              <a:buAutoNum type="arabicPeriod"/>
+              <a:tabLst/>
+              <a:defRPr/>
+            </a:pPr>
+            <a:endParaRPr lang="en-US" dirty="0">
               <a:latin typeface="Calibri Light" panose="020F0302020204030204" pitchFamily="34" charset="0"/>
             </a:endParaRPr>
           </a:p>
@@ -9975,10 +9738,9 @@
           <a:lstStyle/>
           <a:p>
             <a:r>
-              <a:rPr lang="en-US" smtClean="0"/>
+              <a:rPr lang="en-US"/>
               <a:t>1.2</a:t>
             </a:r>
-            <a:endParaRPr lang="en-US"/>
           </a:p>
         </p:txBody>
       </p:sp>
@@ -10286,7 +10048,7 @@
           <a:lstStyle/>
           <a:p>
             <a:r>
-              <a:rPr lang="en-US" altLang="zh-CN" dirty="0" smtClean="0">
+              <a:rPr lang="en-US" altLang="zh-CN" dirty="0">
                 <a:latin typeface="Calibri Light" panose="020F0302020204030204" pitchFamily="34" charset="0"/>
               </a:rPr>
               <a:t>Detail in JavaScript engineering build tools.</a:t>
@@ -10339,7 +10101,7 @@
         </p:blipFill>
         <p:spPr>
           <a:xfrm>
-            <a:off x="493712" y="4191000"/>
+            <a:off x="304800" y="4299805"/>
             <a:ext cx="4552950" cy="1940899"/>
           </a:xfrm>
           <a:prstGeom prst="rect">
@@ -10377,11 +10139,7 @@
             </a:pPr>
             <a:r>
               <a:rPr lang="en-US" sz="2800" dirty="0"/>
-              <a:t>Put Stylesheets at the </a:t>
-            </a:r>
-            <a:r>
-              <a:rPr lang="en-US" sz="2800" dirty="0" smtClean="0"/>
-              <a:t>Top</a:t>
+              <a:t>Put Stylesheets at the Top</a:t>
             </a:r>
           </a:p>
           <a:p>
@@ -10393,12 +10151,8 @@
               <a:buChar char="-"/>
             </a:pPr>
             <a:r>
-              <a:rPr lang="en-US" sz="2800" dirty="0" smtClean="0"/>
-              <a:t>Put </a:t>
-            </a:r>
-            <a:r>
               <a:rPr lang="en-US" sz="2800" dirty="0"/>
-              <a:t>Scripts at the Bottom</a:t>
+              <a:t>Put Scripts at the Bottom</a:t>
             </a:r>
           </a:p>
           <a:p>
@@ -10426,7 +10180,6 @@
               <a:rPr lang="en-US" sz="2800" dirty="0"/>
               <a:t>Minify JavaScript and CSS</a:t>
             </a:r>
-            <a:endParaRPr lang="en-US" sz="2800" dirty="0"/>
           </a:p>
         </p:txBody>
       </p:sp>
@@ -10440,13 +10193,6 @@
   <p:clrMapOvr>
     <a:masterClrMapping/>
   </p:clrMapOvr>
-  <p:timing>
-    <p:tnLst>
-      <p:par>
-        <p:cTn id="1" dur="indefinite" restart="never" nodeType="tmRoot"/>
-      </p:par>
-    </p:tnLst>
-  </p:timing>
 </p:sld>
 </file>
 
@@ -11866,21 +11612,6 @@
 </file>
 
 <file path=customXml/item1.xml><?xml version="1.0" encoding="utf-8"?>
-<?mso-contentType ?>
-<FormTemplates xmlns="http://schemas.microsoft.com/sharepoint/v3/contenttype/forms">
-  <Display>DocumentLibraryForm</Display>
-  <Edit>DocumentLibraryForm</Edit>
-  <New>DocumentLibraryForm</New>
-</FormTemplates>
-</file>
-
-<file path=customXml/item2.xml><?xml version="1.0" encoding="utf-8"?>
-<p:properties xmlns:p="http://schemas.microsoft.com/office/2006/metadata/properties" xmlns:xsi="http://www.w3.org/2001/XMLSchema-instance">
-  <documentManagement/>
-</p:properties>
-</file>
-
-<file path=customXml/item3.xml><?xml version="1.0" encoding="utf-8"?>
 <ct:contentTypeSchema xmlns:ct="http://schemas.microsoft.com/office/2006/metadata/contentType" xmlns:ma="http://schemas.microsoft.com/office/2006/metadata/properties/metaAttributes" ct:_="" ma:_="" ma:contentTypeName="Document" ma:contentTypeID="0x0101004A6A41BA03133F4D9909FFE7D0907B5D" ma:contentTypeVersion="0" ma:contentTypeDescription="Create a new document." ma:contentTypeScope="" ma:versionID="ec9ca77658f11de320fafc408b2cf7c4">
   <xsd:schema xmlns:xsd="http://www.w3.org/2001/XMLSchema" xmlns:p="http://schemas.microsoft.com/office/2006/metadata/properties" targetNamespace="http://schemas.microsoft.com/office/2006/metadata/properties" ma:root="true" ma:fieldsID="4aeb20c0e3442673af7ee10786458764">
     <xsd:element name="properties">
@@ -11929,10 +11660,32 @@
 </ct:contentTypeSchema>
 </file>
 
+<file path=customXml/item2.xml><?xml version="1.0" encoding="utf-8"?>
+<p:properties xmlns:p="http://schemas.microsoft.com/office/2006/metadata/properties" xmlns:xsi="http://www.w3.org/2001/XMLSchema-instance">
+  <documentManagement/>
+</p:properties>
+</file>
+
+<file path=customXml/item3.xml><?xml version="1.0" encoding="utf-8"?>
+<?mso-contentType ?>
+<FormTemplates xmlns="http://schemas.microsoft.com/sharepoint/v3/contenttype/forms">
+  <Display>DocumentLibraryForm</Display>
+  <Edit>DocumentLibraryForm</Edit>
+  <New>DocumentLibraryForm</New>
+</FormTemplates>
+</file>
+
 <file path=customXml/itemProps1.xml><?xml version="1.0" encoding="utf-8"?>
-<ds:datastoreItem xmlns:ds="http://schemas.openxmlformats.org/officeDocument/2006/customXml" ds:itemID="{AF2462E9-E3C6-4B9B-800D-1AA92DB6FEE6}">
+<ds:datastoreItem xmlns:ds="http://schemas.openxmlformats.org/officeDocument/2006/customXml" ds:itemID="{7C87F021-393A-41F0-B687-0AD161F782BF}">
   <ds:schemaRefs>
-    <ds:schemaRef ds:uri="http://schemas.microsoft.com/sharepoint/v3/contenttype/forms"/>
+    <ds:schemaRef ds:uri="http://schemas.microsoft.com/office/2006/metadata/contentType"/>
+    <ds:schemaRef ds:uri="http://schemas.microsoft.com/office/2006/metadata/properties/metaAttributes"/>
+    <ds:schemaRef ds:uri="http://www.w3.org/2001/XMLSchema"/>
+    <ds:schemaRef ds:uri="http://schemas.microsoft.com/office/2006/metadata/properties"/>
+    <ds:schemaRef ds:uri="http://schemas.openxmlformats.org/package/2006/metadata/core-properties"/>
+    <ds:schemaRef ds:uri="http://purl.org/dc/elements/1.1/"/>
+    <ds:schemaRef ds:uri="http://purl.org/dc/terms/"/>
+    <ds:schemaRef ds:uri="http://schemas.microsoft.com/office/internal/2005/internalDocumentation"/>
   </ds:schemaRefs>
 </ds:datastoreItem>
 </file>
@@ -11946,16 +11699,9 @@
 </file>
 
 <file path=customXml/itemProps3.xml><?xml version="1.0" encoding="utf-8"?>
-<ds:datastoreItem xmlns:ds="http://schemas.openxmlformats.org/officeDocument/2006/customXml" ds:itemID="{7C87F021-393A-41F0-B687-0AD161F782BF}">
+<ds:datastoreItem xmlns:ds="http://schemas.openxmlformats.org/officeDocument/2006/customXml" ds:itemID="{AF2462E9-E3C6-4B9B-800D-1AA92DB6FEE6}">
   <ds:schemaRefs>
-    <ds:schemaRef ds:uri="http://schemas.microsoft.com/office/2006/metadata/contentType"/>
-    <ds:schemaRef ds:uri="http://schemas.microsoft.com/office/2006/metadata/properties/metaAttributes"/>
-    <ds:schemaRef ds:uri="http://www.w3.org/2001/XMLSchema"/>
-    <ds:schemaRef ds:uri="http://schemas.microsoft.com/office/2006/metadata/properties"/>
-    <ds:schemaRef ds:uri="http://schemas.openxmlformats.org/package/2006/metadata/core-properties"/>
-    <ds:schemaRef ds:uri="http://purl.org/dc/elements/1.1/"/>
-    <ds:schemaRef ds:uri="http://purl.org/dc/terms/"/>
-    <ds:schemaRef ds:uri="http://schemas.microsoft.com/office/internal/2005/internalDocumentation"/>
+    <ds:schemaRef ds:uri="http://schemas.microsoft.com/sharepoint/v3/contenttype/forms"/>
   </ds:schemaRefs>
 </ds:datastoreItem>
 </file>
</xml_diff>

<commit_message>
[engineering] update ppt author and date.
</commit_message>
<xml_diff>
--- a/engineering/2017/materials/ppt/background.pptx
+++ b/engineering/2017/materials/ppt/background.pptx
@@ -253,7 +253,7 @@
             <a:fld id="{97373330-0875-4F54-B846-34A9C5D83194}" type="datetimeFigureOut">
               <a:rPr lang="en-US" smtClean="0"/>
               <a:pPr/>
-              <a:t>08-04-2017</a:t>
+              <a:t>2017-08-28</a:t>
             </a:fld>
             <a:endParaRPr lang="en-US"/>
           </a:p>
@@ -7426,7 +7426,10 @@
           <a:bodyPr/>
           <a:lstStyle/>
           <a:p>
-            <a:endParaRPr lang="en-US" dirty="0"/>
+            <a:r>
+              <a:rPr lang="en-US" dirty="0"/>
+              <a:t>Jason Cui</a:t>
+            </a:r>
           </a:p>
         </p:txBody>
       </p:sp>
@@ -7452,7 +7455,7 @@
           <a:p>
             <a:r>
               <a:rPr lang="en-US" dirty="0"/>
-              <a:t>2017.08.06</a:t>
+              <a:t>2017.08.31</a:t>
             </a:r>
           </a:p>
         </p:txBody>
@@ -7576,7 +7579,6 @@
               <a:rPr lang="en-US" sz="3200" dirty="0"/>
               <a:t> Introduction</a:t>
             </a:r>
-            <a:endParaRPr lang="en-US" sz="3200" dirty="0"/>
           </a:p>
           <a:p>
             <a:pPr marL="285750" indent="-285750">
@@ -11612,6 +11614,12 @@
 </file>
 
 <file path=customXml/item1.xml><?xml version="1.0" encoding="utf-8"?>
+<p:properties xmlns:p="http://schemas.microsoft.com/office/2006/metadata/properties" xmlns:xsi="http://www.w3.org/2001/XMLSchema-instance">
+  <documentManagement/>
+</p:properties>
+</file>
+
+<file path=customXml/item2.xml><?xml version="1.0" encoding="utf-8"?>
 <ct:contentTypeSchema xmlns:ct="http://schemas.microsoft.com/office/2006/metadata/contentType" xmlns:ma="http://schemas.microsoft.com/office/2006/metadata/properties/metaAttributes" ct:_="" ma:_="" ma:contentTypeName="Document" ma:contentTypeID="0x0101004A6A41BA03133F4D9909FFE7D0907B5D" ma:contentTypeVersion="0" ma:contentTypeDescription="Create a new document." ma:contentTypeScope="" ma:versionID="ec9ca77658f11de320fafc408b2cf7c4">
   <xsd:schema xmlns:xsd="http://www.w3.org/2001/XMLSchema" xmlns:p="http://schemas.microsoft.com/office/2006/metadata/properties" targetNamespace="http://schemas.microsoft.com/office/2006/metadata/properties" ma:root="true" ma:fieldsID="4aeb20c0e3442673af7ee10786458764">
     <xsd:element name="properties">
@@ -11660,12 +11668,6 @@
 </ct:contentTypeSchema>
 </file>
 
-<file path=customXml/item2.xml><?xml version="1.0" encoding="utf-8"?>
-<p:properties xmlns:p="http://schemas.microsoft.com/office/2006/metadata/properties" xmlns:xsi="http://www.w3.org/2001/XMLSchema-instance">
-  <documentManagement/>
-</p:properties>
-</file>
-
 <file path=customXml/item3.xml><?xml version="1.0" encoding="utf-8"?>
 <?mso-contentType ?>
 <FormTemplates xmlns="http://schemas.microsoft.com/sharepoint/v3/contenttype/forms">
@@ -11676,6 +11678,14 @@
 </file>
 
 <file path=customXml/itemProps1.xml><?xml version="1.0" encoding="utf-8"?>
+<ds:datastoreItem xmlns:ds="http://schemas.openxmlformats.org/officeDocument/2006/customXml" ds:itemID="{BC974159-165D-43A7-BAC0-2BE7E1872CAD}">
+  <ds:schemaRefs>
+    <ds:schemaRef ds:uri="http://schemas.microsoft.com/office/2006/metadata/properties"/>
+  </ds:schemaRefs>
+</ds:datastoreItem>
+</file>
+
+<file path=customXml/itemProps2.xml><?xml version="1.0" encoding="utf-8"?>
 <ds:datastoreItem xmlns:ds="http://schemas.openxmlformats.org/officeDocument/2006/customXml" ds:itemID="{7C87F021-393A-41F0-B687-0AD161F782BF}">
   <ds:schemaRefs>
     <ds:schemaRef ds:uri="http://schemas.microsoft.com/office/2006/metadata/contentType"/>
@@ -11690,14 +11700,6 @@
 </ds:datastoreItem>
 </file>
 
-<file path=customXml/itemProps2.xml><?xml version="1.0" encoding="utf-8"?>
-<ds:datastoreItem xmlns:ds="http://schemas.openxmlformats.org/officeDocument/2006/customXml" ds:itemID="{BC974159-165D-43A7-BAC0-2BE7E1872CAD}">
-  <ds:schemaRefs>
-    <ds:schemaRef ds:uri="http://schemas.microsoft.com/office/2006/metadata/properties"/>
-  </ds:schemaRefs>
-</ds:datastoreItem>
-</file>
-
 <file path=customXml/itemProps3.xml><?xml version="1.0" encoding="utf-8"?>
 <ds:datastoreItem xmlns:ds="http://schemas.openxmlformats.org/officeDocument/2006/customXml" ds:itemID="{AF2462E9-E3C6-4B9B-800D-1AA92DB6FEE6}">
   <ds:schemaRefs>

</xml_diff>